<commit_message>
added solution to SelfTicking clock
</commit_message>
<xml_diff>
--- a/Slides/Module 05 Concurrency Patterns in Typescript.pptx
+++ b/Slides/Module 05 Concurrency Patterns in Typescript.pptx
@@ -5,7 +5,7 @@
     <p:sldMasterId id="2147483703" r:id="rId1"/>
   </p:sldMasterIdLst>
   <p:notesMasterIdLst>
-    <p:notesMasterId r:id="rId40"/>
+    <p:notesMasterId r:id="rId41"/>
   </p:notesMasterIdLst>
   <p:sldIdLst>
     <p:sldId id="485" r:id="rId2"/>
@@ -45,7 +45,8 @@
     <p:sldId id="546" r:id="rId36"/>
     <p:sldId id="547" r:id="rId37"/>
     <p:sldId id="548" r:id="rId38"/>
-    <p:sldId id="552" r:id="rId39"/>
+    <p:sldId id="557" r:id="rId39"/>
+    <p:sldId id="552" r:id="rId40"/>
   </p:sldIdLst>
   <p:sldSz cx="12192000" cy="6858000"/>
   <p:notesSz cx="6858000" cy="9144000"/>
@@ -355,16 +356,62 @@
 </p:presentation>
 </file>
 
-<file path=ppt/revisionInfo.xml><?xml version="1.0" encoding="utf-8"?>
-<p1510:revInfo xmlns:a="http://schemas.openxmlformats.org/drawingml/2006/main" xmlns:r="http://schemas.openxmlformats.org/officeDocument/2006/relationships" xmlns:p1510="http://schemas.microsoft.com/office/powerpoint/2015/10/main">
-  <p1510:revLst>
-    <p1510:client id="{AC681E7E-7BCE-42F4-8397-34877DEEDE5D}" v="5" dt="2022-09-09T17:52:22.260"/>
-  </p1510:revLst>
-</p1510:revInfo>
-</file>
-
 <file path=ppt/changesInfos/changesInfo1.xml><?xml version="1.0" encoding="utf-8"?>
 <pc:chgInfo xmlns:a="http://schemas.openxmlformats.org/drawingml/2006/main" xmlns:r="http://schemas.openxmlformats.org/officeDocument/2006/relationships" xmlns:ac="http://schemas.microsoft.com/office/drawing/2013/main/command" xmlns:pc="http://schemas.microsoft.com/office/powerpoint/2013/main/command">
+  <pc:docChgLst>
+    <pc:chgData name="Mitchell Wand" userId="de9b44c55c049659" providerId="LiveId" clId="{5F788236-F622-4F92-81A2-AAB773A767CB}"/>
+    <pc:docChg chg="undo custSel addSld modSld">
+      <pc:chgData name="Mitchell Wand" userId="de9b44c55c049659" providerId="LiveId" clId="{5F788236-F622-4F92-81A2-AAB773A767CB}" dt="2022-09-20T18:38:28.835" v="671" actId="20577"/>
+      <pc:docMkLst>
+        <pc:docMk/>
+      </pc:docMkLst>
+      <pc:sldChg chg="modNotesTx">
+        <pc:chgData name="Mitchell Wand" userId="de9b44c55c049659" providerId="LiveId" clId="{5F788236-F622-4F92-81A2-AAB773A767CB}" dt="2022-09-20T17:28:28.152" v="82" actId="20577"/>
+        <pc:sldMkLst>
+          <pc:docMk/>
+          <pc:sldMk cId="0" sldId="262"/>
+        </pc:sldMkLst>
+      </pc:sldChg>
+      <pc:sldChg chg="modNotesTx">
+        <pc:chgData name="Mitchell Wand" userId="de9b44c55c049659" providerId="LiveId" clId="{5F788236-F622-4F92-81A2-AAB773A767CB}" dt="2022-09-20T17:29:13.896" v="184" actId="20577"/>
+        <pc:sldMkLst>
+          <pc:docMk/>
+          <pc:sldMk cId="966027799" sldId="514"/>
+        </pc:sldMkLst>
+      </pc:sldChg>
+      <pc:sldChg chg="addSp modSp new mod modNotesTx">
+        <pc:chgData name="Mitchell Wand" userId="de9b44c55c049659" providerId="LiveId" clId="{5F788236-F622-4F92-81A2-AAB773A767CB}" dt="2022-09-20T18:38:28.835" v="671" actId="20577"/>
+        <pc:sldMkLst>
+          <pc:docMk/>
+          <pc:sldMk cId="3573365039" sldId="557"/>
+        </pc:sldMkLst>
+        <pc:spChg chg="mod">
+          <ac:chgData name="Mitchell Wand" userId="de9b44c55c049659" providerId="LiveId" clId="{5F788236-F622-4F92-81A2-AAB773A767CB}" dt="2022-09-20T18:38:28.835" v="671" actId="20577"/>
+          <ac:spMkLst>
+            <pc:docMk/>
+            <pc:sldMk cId="3573365039" sldId="557"/>
+            <ac:spMk id="2" creationId="{4AB7B9C2-5D09-C319-491E-9E97079CFA3D}"/>
+          </ac:spMkLst>
+        </pc:spChg>
+        <pc:spChg chg="mod">
+          <ac:chgData name="Mitchell Wand" userId="de9b44c55c049659" providerId="LiveId" clId="{5F788236-F622-4F92-81A2-AAB773A767CB}" dt="2022-09-20T18:34:42.701" v="281"/>
+          <ac:spMkLst>
+            <pc:docMk/>
+            <pc:sldMk cId="3573365039" sldId="557"/>
+            <ac:spMk id="3" creationId="{E95A29C5-3A07-008B-EE77-48C8F818925D}"/>
+          </ac:spMkLst>
+        </pc:spChg>
+        <pc:spChg chg="add mod">
+          <ac:chgData name="Mitchell Wand" userId="de9b44c55c049659" providerId="LiveId" clId="{5F788236-F622-4F92-81A2-AAB773A767CB}" dt="2022-09-20T18:36:09.157" v="308" actId="6549"/>
+          <ac:spMkLst>
+            <pc:docMk/>
+            <pc:sldMk cId="3573365039" sldId="557"/>
+            <ac:spMk id="6" creationId="{D7EEA937-36F0-3A62-61A1-D81A0C7A205D}"/>
+          </ac:spMkLst>
+        </pc:spChg>
+      </pc:sldChg>
+    </pc:docChg>
+  </pc:docChgLst>
   <pc:docChgLst>
     <pc:chgData name="Mitchell Wand" userId="de9b44c55c049659" providerId="LiveId" clId="{AC681E7E-7BCE-42F4-8397-34877DEEDE5D}"/>
     <pc:docChg chg="addSld delSld modSld">
@@ -770,7 +817,7 @@
           <a:p>
             <a:r>
               <a:rPr lang="en-US" dirty="0"/>
-              <a:t>Concurrency lets us mask latency. </a:t>
+              <a:t>We should leverage concurrency whenever possible. Again, in this example, it seems like it’s probably OK to make all of the requests at once, and then wait for the responses.</a:t>
             </a:r>
           </a:p>
           <a:p>
@@ -779,39 +826,20 @@
           <a:p>
             <a:r>
               <a:rPr lang="en-US" dirty="0"/>
-              <a:t>Well-written asynchronous code leverages concurrency when possible.</a:t>
-            </a:r>
-          </a:p>
-          <a:p>
+              <a:t>Multiple “awaits” on left means (read slide)</a:t>
+            </a:r>
+          </a:p>
+          <a:p>
+            <a:endParaRPr lang="en-US" dirty="0"/>
+          </a:p>
+          <a:p>
+            <a:r>
+              <a:rPr lang="en-US" dirty="0" err="1"/>
+              <a:t>Promise.all</a:t>
+            </a:r>
             <a:r>
               <a:rPr lang="en-US" dirty="0"/>
-              <a:t>If you have a bunch of things that can be done at the same time, say, making 3 requests to servers, and you don’t care the order in which those requests are made, then do not write code that enforces any ordering. The example on the right will produce output that might have a different order than the one on the left, but if we are OK with that, we can mask how slow that I/O is by doing things concurrently.</a:t>
-            </a:r>
-          </a:p>
-          <a:p>
-            <a:endParaRPr lang="en-US" dirty="0"/>
-          </a:p>
-          <a:p>
-            <a:r>
-              <a:rPr lang="en-US" dirty="0"/>
-              <a:t>(Click through builds to see the sequence of operations. The * stands in for </a:t>
-            </a:r>
-            <a:r>
-              <a:rPr lang="en-US" dirty="0" err="1"/>
-              <a:t>console.log</a:t>
-            </a:r>
-            <a:r>
-              <a:rPr lang="en-US" dirty="0"/>
-              <a:t>, boxes are not to-scale. Notice how on the concurrent one the results got printed as 3,2,1.</a:t>
-            </a:r>
-          </a:p>
-          <a:p>
-            <a:endParaRPr lang="en-US" dirty="0"/>
-          </a:p>
-          <a:p>
-            <a:r>
-              <a:rPr lang="en-US" dirty="0"/>
-              <a:t>In this simple example the performance difference is a small absolute number (130msec), but another way of saying it is that the code on the left is 3x slower!</a:t>
+              <a:t> on right means (read slide)</a:t>
             </a:r>
           </a:p>
         </p:txBody>
@@ -819,7 +847,7 @@
     </p:spTree>
     <p:extLst>
       <p:ext uri="{BB962C8B-B14F-4D97-AF65-F5344CB8AC3E}">
-        <p14:creationId xmlns:p14="http://schemas.microsoft.com/office/powerpoint/2010/main" val="3672567741"/>
+        <p14:creationId xmlns:p14="http://schemas.microsoft.com/office/powerpoint/2010/main" val="2468432417"/>
       </p:ext>
     </p:extLst>
   </p:cSld>
@@ -875,7 +903,7 @@
           <a:p>
             <a:r>
               <a:rPr lang="en-US" dirty="0"/>
-              <a:t>For the rest of this lesson, we’ll look at a more interesting example, where we will make multiple requests to a web service. This slide documents the operations that this web service supports. We’ll discuss more how this document is structured and what all of the words mean in the next lesson, on REST</a:t>
+              <a:t>Concurrency lets us mask latency. </a:t>
             </a:r>
           </a:p>
           <a:p>
@@ -884,7 +912,39 @@
           <a:p>
             <a:r>
               <a:rPr lang="en-US" dirty="0"/>
-              <a:t>For now, the important part to understand is that this is a service that tracks student transcripts. It supports creating new transcripts, fetching a student’s transcript by the student’s ID, and listing the students in the system.</a:t>
+              <a:t>Well-written asynchronous code leverages concurrency when possible.</a:t>
+            </a:r>
+          </a:p>
+          <a:p>
+            <a:r>
+              <a:rPr lang="en-US" dirty="0"/>
+              <a:t>If you have a bunch of things that can be done at the same time, say, making 3 requests to servers, and you don’t care the order in which those requests are made, then do not write code that enforces any ordering. The example on the right will produce output that might have a different order than the one on the left, but if we are OK with that, we can mask how slow that I/O is by doing things concurrently.</a:t>
+            </a:r>
+          </a:p>
+          <a:p>
+            <a:endParaRPr lang="en-US" dirty="0"/>
+          </a:p>
+          <a:p>
+            <a:r>
+              <a:rPr lang="en-US" dirty="0"/>
+              <a:t>(Click through builds to see the sequence of operations. The * stands in for </a:t>
+            </a:r>
+            <a:r>
+              <a:rPr lang="en-US" dirty="0" err="1"/>
+              <a:t>console.log</a:t>
+            </a:r>
+            <a:r>
+              <a:rPr lang="en-US" dirty="0"/>
+              <a:t>, boxes are not to-scale. Notice how on the concurrent one the results got printed as 3,2,1.</a:t>
+            </a:r>
+          </a:p>
+          <a:p>
+            <a:endParaRPr lang="en-US" dirty="0"/>
+          </a:p>
+          <a:p>
+            <a:r>
+              <a:rPr lang="en-US" dirty="0"/>
+              <a:t>In this simple example the performance difference is a small absolute number (130msec), but another way of saying it is that the code on the left is 3x slower!</a:t>
             </a:r>
           </a:p>
         </p:txBody>
@@ -892,7 +952,7 @@
     </p:spTree>
     <p:extLst>
       <p:ext uri="{BB962C8B-B14F-4D97-AF65-F5344CB8AC3E}">
-        <p14:creationId xmlns:p14="http://schemas.microsoft.com/office/powerpoint/2010/main" val="1493980668"/>
+        <p14:creationId xmlns:p14="http://schemas.microsoft.com/office/powerpoint/2010/main" val="3672567741"/>
       </p:ext>
     </p:extLst>
   </p:cSld>
@@ -946,14 +1006,26 @@
           <a:bodyPr/>
           <a:lstStyle/>
           <a:p>
+            <a:r>
+              <a:rPr lang="en-US" dirty="0"/>
+              <a:t>For the rest of this lesson, we’ll look at a more interesting example, where we will make multiple requests to a web service. This slide documents the operations that this web service supports. We’ll discuss more how this document is structured and what all of the words mean in the next lesson, on REST</a:t>
+            </a:r>
+          </a:p>
+          <a:p>
             <a:endParaRPr lang="en-US" dirty="0"/>
+          </a:p>
+          <a:p>
+            <a:r>
+              <a:rPr lang="en-US" dirty="0"/>
+              <a:t>For now, the important part to understand is that this is a service that tracks student transcripts. It supports creating new transcripts, fetching a student’s transcript by the student’s ID, and listing the students in the system.</a:t>
+            </a:r>
           </a:p>
         </p:txBody>
       </p:sp>
     </p:spTree>
     <p:extLst>
       <p:ext uri="{BB962C8B-B14F-4D97-AF65-F5344CB8AC3E}">
-        <p14:creationId xmlns:p14="http://schemas.microsoft.com/office/powerpoint/2010/main" val="993467052"/>
+        <p14:creationId xmlns:p14="http://schemas.microsoft.com/office/powerpoint/2010/main" val="1493980668"/>
       </p:ext>
     </p:extLst>
   </p:cSld>
@@ -1007,25 +1079,14 @@
           <a:bodyPr/>
           <a:lstStyle/>
           <a:p>
-            <a:r>
-              <a:rPr lang="en-US" dirty="0"/>
-              <a:t>For each student, we’ll need to fetch the transcript.  This is an http request, so we do it asynchronously.   First, we describe the promise we’d like to make for this student.  The promise is to call </a:t>
-            </a:r>
-            <a:r>
-              <a:rPr lang="en-US" dirty="0" err="1"/>
-              <a:t>axios</a:t>
-            </a:r>
-            <a:r>
-              <a:rPr lang="en-US" dirty="0"/>
-              <a:t> and wait for the result.</a:t>
-            </a:r>
+            <a:endParaRPr lang="en-US" dirty="0"/>
           </a:p>
         </p:txBody>
       </p:sp>
     </p:spTree>
     <p:extLst>
       <p:ext uri="{BB962C8B-B14F-4D97-AF65-F5344CB8AC3E}">
-        <p14:creationId xmlns:p14="http://schemas.microsoft.com/office/powerpoint/2010/main" val="1593653360"/>
+        <p14:creationId xmlns:p14="http://schemas.microsoft.com/office/powerpoint/2010/main" val="993467052"/>
       </p:ext>
     </p:extLst>
   </p:cSld>
@@ -1079,14 +1140,25 @@
           <a:bodyPr/>
           <a:lstStyle/>
           <a:p>
-            <a:endParaRPr lang="en-US" dirty="0"/>
+            <a:r>
+              <a:rPr lang="en-US" dirty="0"/>
+              <a:t>For each student, we’ll need to fetch the transcript.  This is an http request, so we do it asynchronously.   First, we describe the promise we’d like to make for this student.  The promise is to call </a:t>
+            </a:r>
+            <a:r>
+              <a:rPr lang="en-US" dirty="0" err="1"/>
+              <a:t>axios</a:t>
+            </a:r>
+            <a:r>
+              <a:rPr lang="en-US" dirty="0"/>
+              <a:t> and wait for the result.</a:t>
+            </a:r>
           </a:p>
         </p:txBody>
       </p:sp>
     </p:spTree>
     <p:extLst>
       <p:ext uri="{BB962C8B-B14F-4D97-AF65-F5344CB8AC3E}">
-        <p14:creationId xmlns:p14="http://schemas.microsoft.com/office/powerpoint/2010/main" val="3778395246"/>
+        <p14:creationId xmlns:p14="http://schemas.microsoft.com/office/powerpoint/2010/main" val="1593653360"/>
       </p:ext>
     </p:extLst>
   </p:cSld>
@@ -1140,37 +1212,6 @@
           <a:bodyPr/>
           <a:lstStyle/>
           <a:p>
-            <a:pPr marL="0" marR="0" lvl="0" indent="0" defTabSz="228600" eaLnBrk="1" fontAlgn="auto" latinLnBrk="0" hangingPunct="1">
-              <a:lnSpc>
-                <a:spcPct val="117999"/>
-              </a:lnSpc>
-              <a:spcBef>
-                <a:spcPts val="0"/>
-              </a:spcBef>
-              <a:spcAft>
-                <a:spcPts val="0"/>
-              </a:spcAft>
-              <a:buClrTx/>
-              <a:buSzTx/>
-              <a:buFontTx/>
-              <a:buNone/>
-              <a:tabLst/>
-              <a:defRPr/>
-            </a:pPr>
-            <a:r>
-              <a:rPr lang="en-US" dirty="0"/>
-              <a:t>.This pattern of taking an array of stuff and ‘</a:t>
-            </a:r>
-            <a:r>
-              <a:rPr lang="en-US" dirty="0" err="1"/>
-              <a:t>map’ing</a:t>
-            </a:r>
-            <a:r>
-              <a:rPr lang="en-US" dirty="0"/>
-              <a:t> it to promises is extremely common and valuable – you should write this down. </a:t>
-            </a:r>
-          </a:p>
-          <a:p>
             <a:endParaRPr lang="en-US" dirty="0"/>
           </a:p>
         </p:txBody>
@@ -1178,7 +1219,7 @@
     </p:spTree>
     <p:extLst>
       <p:ext uri="{BB962C8B-B14F-4D97-AF65-F5344CB8AC3E}">
-        <p14:creationId xmlns:p14="http://schemas.microsoft.com/office/powerpoint/2010/main" val="2913346644"/>
+        <p14:creationId xmlns:p14="http://schemas.microsoft.com/office/powerpoint/2010/main" val="3778395246"/>
       </p:ext>
     </p:extLst>
   </p:cSld>
@@ -1232,17 +1273,45 @@
           <a:bodyPr/>
           <a:lstStyle/>
           <a:p>
+            <a:pPr marL="0" marR="0" lvl="0" indent="0" defTabSz="228600" eaLnBrk="1" fontAlgn="auto" latinLnBrk="0" hangingPunct="1">
+              <a:lnSpc>
+                <a:spcPct val="117999"/>
+              </a:lnSpc>
+              <a:spcBef>
+                <a:spcPts val="0"/>
+              </a:spcBef>
+              <a:spcAft>
+                <a:spcPts val="0"/>
+              </a:spcAft>
+              <a:buClrTx/>
+              <a:buSzTx/>
+              <a:buFontTx/>
+              <a:buNone/>
+              <a:tabLst/>
+              <a:defRPr/>
+            </a:pPr>
             <a:r>
               <a:rPr lang="en-US" dirty="0"/>
-              <a:t>Here’s our mapping pattern again:  We take an array, map it to promises, and wait for all of them to finish.   This is how we start lots of jobs asynchronously.</a:t>
-            </a:r>
+              <a:t>.This pattern of taking an array of stuff and ‘</a:t>
+            </a:r>
+            <a:r>
+              <a:rPr lang="en-US" dirty="0" err="1"/>
+              <a:t>map’ing</a:t>
+            </a:r>
+            <a:r>
+              <a:rPr lang="en-US" dirty="0"/>
+              <a:t> it to promises is extremely common and valuable – you should write this down. </a:t>
+            </a:r>
+          </a:p>
+          <a:p>
+            <a:endParaRPr lang="en-US" dirty="0"/>
           </a:p>
         </p:txBody>
       </p:sp>
     </p:spTree>
     <p:extLst>
       <p:ext uri="{BB962C8B-B14F-4D97-AF65-F5344CB8AC3E}">
-        <p14:creationId xmlns:p14="http://schemas.microsoft.com/office/powerpoint/2010/main" val="1575106418"/>
+        <p14:creationId xmlns:p14="http://schemas.microsoft.com/office/powerpoint/2010/main" val="2913346644"/>
       </p:ext>
     </p:extLst>
   </p:cSld>
@@ -1296,6 +1365,70 @@
           <a:bodyPr/>
           <a:lstStyle/>
           <a:p>
+            <a:r>
+              <a:rPr lang="en-US" dirty="0"/>
+              <a:t>Here’s our mapping pattern again:  We take an array, map it to promises, and wait for all of them to finish.   This is how we start lots of jobs asynchronously.</a:t>
+            </a:r>
+          </a:p>
+        </p:txBody>
+      </p:sp>
+    </p:spTree>
+    <p:extLst>
+      <p:ext uri="{BB962C8B-B14F-4D97-AF65-F5344CB8AC3E}">
+        <p14:creationId xmlns:p14="http://schemas.microsoft.com/office/powerpoint/2010/main" val="1575106418"/>
+      </p:ext>
+    </p:extLst>
+  </p:cSld>
+  <p:clrMapOvr>
+    <a:masterClrMapping/>
+  </p:clrMapOvr>
+</p:notes>
+</file>
+
+<file path=ppt/notesSlides/notesSlide18.xml><?xml version="1.0" encoding="utf-8"?>
+<p:notes xmlns:a="http://schemas.openxmlformats.org/drawingml/2006/main" xmlns:r="http://schemas.openxmlformats.org/officeDocument/2006/relationships" xmlns:p="http://schemas.openxmlformats.org/presentationml/2006/main">
+  <p:cSld>
+    <p:spTree>
+      <p:nvGrpSpPr>
+        <p:cNvPr id="1" name=""/>
+        <p:cNvGrpSpPr/>
+        <p:nvPr/>
+      </p:nvGrpSpPr>
+      <p:grpSpPr>
+        <a:xfrm>
+          <a:off x="0" y="0"/>
+          <a:ext cx="0" cy="0"/>
+          <a:chOff x="0" y="0"/>
+          <a:chExt cx="0" cy="0"/>
+        </a:xfrm>
+      </p:grpSpPr>
+      <p:sp>
+        <p:nvSpPr>
+          <p:cNvPr id="2" name="Slide Image Placeholder 1"/>
+          <p:cNvSpPr>
+            <a:spLocks noGrp="1" noRot="1" noChangeAspect="1"/>
+          </p:cNvSpPr>
+          <p:nvPr>
+            <p:ph type="sldImg"/>
+          </p:nvPr>
+        </p:nvSpPr>
+        <p:spPr/>
+      </p:sp>
+      <p:sp>
+        <p:nvSpPr>
+          <p:cNvPr id="3" name="Notes Placeholder 2"/>
+          <p:cNvSpPr>
+            <a:spLocks noGrp="1"/>
+          </p:cNvSpPr>
+          <p:nvPr>
+            <p:ph type="body" idx="1"/>
+          </p:nvPr>
+        </p:nvSpPr>
+        <p:spPr/>
+        <p:txBody>
+          <a:bodyPr/>
+          <a:lstStyle/>
+          <a:p>
             <a:endParaRPr lang="en-US" dirty="0"/>
           </a:p>
         </p:txBody>
@@ -1313,7 +1446,7 @@
 </p:notes>
 </file>
 
-<file path=ppt/notesSlides/notesSlide18.xml><?xml version="1.0" encoding="utf-8"?>
+<file path=ppt/notesSlides/notesSlide19.xml><?xml version="1.0" encoding="utf-8"?>
 <p:notes xmlns:a="http://schemas.openxmlformats.org/drawingml/2006/main" xmlns:r="http://schemas.openxmlformats.org/officeDocument/2006/relationships" xmlns:p="http://schemas.openxmlformats.org/presentationml/2006/main">
   <p:cSld>
     <p:spTree>
@@ -1492,104 +1625,6 @@
     <p:extLst>
       <p:ext uri="{BB962C8B-B14F-4D97-AF65-F5344CB8AC3E}">
         <p14:creationId xmlns:p14="http://schemas.microsoft.com/office/powerpoint/2010/main" val="32895525"/>
-      </p:ext>
-    </p:extLst>
-  </p:cSld>
-  <p:clrMapOvr>
-    <a:masterClrMapping/>
-  </p:clrMapOvr>
-</p:notes>
-</file>
-
-<file path=ppt/notesSlides/notesSlide19.xml><?xml version="1.0" encoding="utf-8"?>
-<p:notes xmlns:a="http://schemas.openxmlformats.org/drawingml/2006/main" xmlns:r="http://schemas.openxmlformats.org/officeDocument/2006/relationships" xmlns:p="http://schemas.openxmlformats.org/presentationml/2006/main">
-  <p:cSld>
-    <p:spTree>
-      <p:nvGrpSpPr>
-        <p:cNvPr id="1" name=""/>
-        <p:cNvGrpSpPr/>
-        <p:nvPr/>
-      </p:nvGrpSpPr>
-      <p:grpSpPr>
-        <a:xfrm>
-          <a:off x="0" y="0"/>
-          <a:ext cx="0" cy="0"/>
-          <a:chOff x="0" y="0"/>
-          <a:chExt cx="0" cy="0"/>
-        </a:xfrm>
-      </p:grpSpPr>
-      <p:sp>
-        <p:nvSpPr>
-          <p:cNvPr id="641" name="Shape 641"/>
-          <p:cNvSpPr>
-            <a:spLocks noGrp="1" noRot="1" noChangeAspect="1"/>
-          </p:cNvSpPr>
-          <p:nvPr>
-            <p:ph type="sldImg"/>
-          </p:nvPr>
-        </p:nvSpPr>
-        <p:spPr>
-          <a:prstGeom prst="rect">
-            <a:avLst/>
-          </a:prstGeom>
-        </p:spPr>
-        <p:txBody>
-          <a:bodyPr/>
-          <a:lstStyle/>
-          <a:p>
-            <a:endParaRPr/>
-          </a:p>
-        </p:txBody>
-      </p:sp>
-      <p:sp>
-        <p:nvSpPr>
-          <p:cNvPr id="642" name="Shape 642"/>
-          <p:cNvSpPr>
-            <a:spLocks noGrp="1"/>
-          </p:cNvSpPr>
-          <p:nvPr>
-            <p:ph type="body" sz="quarter" idx="1"/>
-          </p:nvPr>
-        </p:nvSpPr>
-        <p:spPr>
-          <a:prstGeom prst="rect">
-            <a:avLst/>
-          </a:prstGeom>
-        </p:spPr>
-        <p:txBody>
-          <a:bodyPr/>
-          <a:lstStyle/>
-          <a:p>
-            <a:r>
-              <a:rPr lang="en-US" dirty="0"/>
-              <a:t>For this activity, you will work with an API client that we will provide to interact with our transcript server.</a:t>
-            </a:r>
-          </a:p>
-          <a:p>
-            <a:endParaRPr lang="en-US" dirty="0"/>
-          </a:p>
-          <a:p>
-            <a:r>
-              <a:rPr lang="en-US" dirty="0"/>
-              <a:t>&lt;read slide&gt;</a:t>
-            </a:r>
-          </a:p>
-          <a:p>
-            <a:endParaRPr lang="en-US" dirty="0"/>
-          </a:p>
-          <a:p>
-            <a:r>
-              <a:rPr lang="en-US" dirty="0"/>
-              <a:t>Next lesson will dive into REST and how this server works.</a:t>
-            </a:r>
-            <a:endParaRPr dirty="0"/>
-          </a:p>
-        </p:txBody>
-      </p:sp>
-    </p:spTree>
-    <p:extLst>
-      <p:ext uri="{BB962C8B-B14F-4D97-AF65-F5344CB8AC3E}">
-        <p14:creationId xmlns:p14="http://schemas.microsoft.com/office/powerpoint/2010/main" val="1192684295"/>
       </p:ext>
     </p:extLst>
   </p:cSld>
@@ -1705,7 +1740,7 @@
       </p:grpSpPr>
       <p:sp>
         <p:nvSpPr>
-          <p:cNvPr id="2" name="Slide Image Placeholder 1"/>
+          <p:cNvPr id="641" name="Shape 641"/>
           <p:cNvSpPr>
             <a:spLocks noGrp="1" noRot="1" noChangeAspect="1"/>
           </p:cNvSpPr>
@@ -1713,57 +1748,68 @@
             <p:ph type="sldImg"/>
           </p:nvPr>
         </p:nvSpPr>
-        <p:spPr/>
+        <p:spPr>
+          <a:prstGeom prst="rect">
+            <a:avLst/>
+          </a:prstGeom>
+        </p:spPr>
+        <p:txBody>
+          <a:bodyPr/>
+          <a:lstStyle/>
+          <a:p>
+            <a:endParaRPr/>
+          </a:p>
+        </p:txBody>
       </p:sp>
       <p:sp>
         <p:nvSpPr>
-          <p:cNvPr id="3" name="Notes Placeholder 2"/>
+          <p:cNvPr id="642" name="Shape 642"/>
           <p:cNvSpPr>
             <a:spLocks noGrp="1"/>
           </p:cNvSpPr>
           <p:nvPr>
-            <p:ph type="body" idx="1"/>
+            <p:ph type="body" sz="quarter" idx="1"/>
           </p:nvPr>
         </p:nvSpPr>
-        <p:spPr/>
+        <p:spPr>
+          <a:prstGeom prst="rect">
+            <a:avLst/>
+          </a:prstGeom>
+        </p:spPr>
         <p:txBody>
           <a:bodyPr/>
           <a:lstStyle/>
           <a:p>
             <a:r>
               <a:rPr lang="en-US" dirty="0"/>
+              <a:t>For this activity, you will work with an API client that we will provide to interact with our transcript server.</a:t>
+            </a:r>
+          </a:p>
+          <a:p>
+            <a:endParaRPr lang="en-US" dirty="0"/>
+          </a:p>
+          <a:p>
+            <a:r>
+              <a:rPr lang="en-US" dirty="0"/>
               <a:t>&lt;read slide&gt;</a:t>
             </a:r>
           </a:p>
-        </p:txBody>
-      </p:sp>
-      <p:sp>
-        <p:nvSpPr>
-          <p:cNvPr id="4" name="Slide Number Placeholder 3"/>
-          <p:cNvSpPr>
-            <a:spLocks noGrp="1"/>
-          </p:cNvSpPr>
-          <p:nvPr>
-            <p:ph type="sldNum" sz="quarter" idx="5"/>
-          </p:nvPr>
-        </p:nvSpPr>
-        <p:spPr/>
-        <p:txBody>
-          <a:bodyPr/>
-          <a:lstStyle/>
-          <a:p>
-            <a:fld id="{07937F07-1250-4CCE-B198-1B2887014F41}" type="slidenum">
-              <a:rPr lang="en-US" smtClean="0"/>
-              <a:t>26</a:t>
-            </a:fld>
-            <a:endParaRPr lang="en-US"/>
+          <a:p>
+            <a:endParaRPr lang="en-US" dirty="0"/>
+          </a:p>
+          <a:p>
+            <a:r>
+              <a:rPr lang="en-US" dirty="0"/>
+              <a:t>Next lesson will dive into REST and how this server works.</a:t>
+            </a:r>
+            <a:endParaRPr dirty="0"/>
           </a:p>
         </p:txBody>
       </p:sp>
     </p:spTree>
     <p:extLst>
       <p:ext uri="{BB962C8B-B14F-4D97-AF65-F5344CB8AC3E}">
-        <p14:creationId xmlns:p14="http://schemas.microsoft.com/office/powerpoint/2010/main" val="391175510"/>
+        <p14:creationId xmlns:p14="http://schemas.microsoft.com/office/powerpoint/2010/main" val="1192684295"/>
       </p:ext>
     </p:extLst>
   </p:cSld>
@@ -1841,7 +1887,7 @@
           <a:p>
             <a:fld id="{07937F07-1250-4CCE-B198-1B2887014F41}" type="slidenum">
               <a:rPr lang="en-US" smtClean="0"/>
-              <a:t>27</a:t>
+              <a:t>26</a:t>
             </a:fld>
             <a:endParaRPr lang="en-US"/>
           </a:p>
@@ -1850,7 +1896,7 @@
     </p:spTree>
     <p:extLst>
       <p:ext uri="{BB962C8B-B14F-4D97-AF65-F5344CB8AC3E}">
-        <p14:creationId xmlns:p14="http://schemas.microsoft.com/office/powerpoint/2010/main" val="1416934236"/>
+        <p14:creationId xmlns:p14="http://schemas.microsoft.com/office/powerpoint/2010/main" val="391175510"/>
       </p:ext>
     </p:extLst>
   </p:cSld>
@@ -1906,15 +1952,38 @@
           <a:p>
             <a:r>
               <a:rPr lang="en-US" dirty="0"/>
-              <a:t>(Read slide, these points summarize past few slides, adding the note that if you have concurrency, you have concurrency)</a:t>
-            </a:r>
+              <a:t>&lt;read slide&gt;</a:t>
+            </a:r>
+          </a:p>
+        </p:txBody>
+      </p:sp>
+      <p:sp>
+        <p:nvSpPr>
+          <p:cNvPr id="4" name="Slide Number Placeholder 3"/>
+          <p:cNvSpPr>
+            <a:spLocks noGrp="1"/>
+          </p:cNvSpPr>
+          <p:nvPr>
+            <p:ph type="sldNum" sz="quarter" idx="5"/>
+          </p:nvPr>
+        </p:nvSpPr>
+        <p:spPr/>
+        <p:txBody>
+          <a:bodyPr/>
+          <a:lstStyle/>
+          <a:p>
+            <a:fld id="{07937F07-1250-4CCE-B198-1B2887014F41}" type="slidenum">
+              <a:rPr lang="en-US" smtClean="0"/>
+              <a:t>27</a:t>
+            </a:fld>
+            <a:endParaRPr lang="en-US"/>
           </a:p>
         </p:txBody>
       </p:sp>
     </p:spTree>
     <p:extLst>
       <p:ext uri="{BB962C8B-B14F-4D97-AF65-F5344CB8AC3E}">
-        <p14:creationId xmlns:p14="http://schemas.microsoft.com/office/powerpoint/2010/main" val="358283542"/>
+        <p14:creationId xmlns:p14="http://schemas.microsoft.com/office/powerpoint/2010/main" val="1416934236"/>
       </p:ext>
     </p:extLst>
   </p:cSld>
@@ -1970,32 +2039,7 @@
           <a:p>
             <a:r>
               <a:rPr lang="en-US" dirty="0"/>
-              <a:t>Promises enforce the order of operations only through the .then. The code in the ‘then’ won’t run until the promise is resolved.</a:t>
-            </a:r>
-          </a:p>
-          <a:p>
-            <a:br>
-              <a:rPr lang="en-US" dirty="0"/>
-            </a:br>
-            <a:r>
-              <a:rPr lang="en-US" dirty="0"/>
-              <a:t>(build through example, explaining the possible orders of results. Point out that we should never depend on the order of results we hear back form google/</a:t>
-            </a:r>
-            <a:r>
-              <a:rPr lang="en-US" dirty="0" err="1"/>
-              <a:t>facebook</a:t>
-            </a:r>
-            <a:r>
-              <a:rPr lang="en-US" dirty="0"/>
-              <a:t>/</a:t>
-            </a:r>
-            <a:r>
-              <a:rPr lang="en-US" dirty="0" err="1"/>
-              <a:t>coveytown</a:t>
-            </a:r>
-            <a:r>
-              <a:rPr lang="en-US" dirty="0"/>
-              <a:t> because it is non-deterministic. You might happen to see 9/10 times one ordering, but there is no guarantee)</a:t>
+              <a:t>(Read slide, these points summarize past few slides, adding the note that if you have concurrency, you have concurrency)</a:t>
             </a:r>
           </a:p>
         </p:txBody>
@@ -2003,7 +2047,7 @@
     </p:spTree>
     <p:extLst>
       <p:ext uri="{BB962C8B-B14F-4D97-AF65-F5344CB8AC3E}">
-        <p14:creationId xmlns:p14="http://schemas.microsoft.com/office/powerpoint/2010/main" val="2370993432"/>
+        <p14:creationId xmlns:p14="http://schemas.microsoft.com/office/powerpoint/2010/main" val="358283542"/>
       </p:ext>
     </p:extLst>
   </p:cSld>
@@ -2059,7 +2103,32 @@
           <a:p>
             <a:r>
               <a:rPr lang="en-US" dirty="0"/>
-              <a:t>Promises </a:t>
+              <a:t>Promises enforce the order of operations only through the .then. The code in the ‘then’ won’t run until the promise is resolved.</a:t>
+            </a:r>
+          </a:p>
+          <a:p>
+            <a:br>
+              <a:rPr lang="en-US" dirty="0"/>
+            </a:br>
+            <a:r>
+              <a:rPr lang="en-US" dirty="0"/>
+              <a:t>(build through example, explaining the possible orders of results. Point out that we should never depend on the order of results we hear back form google/</a:t>
+            </a:r>
+            <a:r>
+              <a:rPr lang="en-US" dirty="0" err="1"/>
+              <a:t>facebook</a:t>
+            </a:r>
+            <a:r>
+              <a:rPr lang="en-US" dirty="0"/>
+              <a:t>/</a:t>
+            </a:r>
+            <a:r>
+              <a:rPr lang="en-US" dirty="0" err="1"/>
+              <a:t>coveytown</a:t>
+            </a:r>
+            <a:r>
+              <a:rPr lang="en-US" dirty="0"/>
+              <a:t> because it is non-deterministic. You might happen to see 9/10 times one ordering, but there is no guarantee)</a:t>
             </a:r>
           </a:p>
         </p:txBody>
@@ -2067,7 +2136,7 @@
     </p:spTree>
     <p:extLst>
       <p:ext uri="{BB962C8B-B14F-4D97-AF65-F5344CB8AC3E}">
-        <p14:creationId xmlns:p14="http://schemas.microsoft.com/office/powerpoint/2010/main" val="2379886627"/>
+        <p14:creationId xmlns:p14="http://schemas.microsoft.com/office/powerpoint/2010/main" val="2370993432"/>
       </p:ext>
     </p:extLst>
   </p:cSld>
@@ -2123,37 +2192,7 @@
           <a:p>
             <a:r>
               <a:rPr lang="en-US" dirty="0"/>
-              <a:t>Here is a one-slide comparison of async/await and promises. You should be familiar with the “rules of the road” for async/await.</a:t>
-            </a:r>
-          </a:p>
-          <a:p>
-            <a:r>
-              <a:rPr lang="en-US" dirty="0"/>
-              <a:t>(read slide)</a:t>
-            </a:r>
-          </a:p>
-          <a:p>
-            <a:endParaRPr lang="en-US" dirty="0"/>
-          </a:p>
-          <a:p>
-            <a:r>
-              <a:rPr lang="en-US" dirty="0"/>
-              <a:t>We haven’t talked about error handling yet, but that doesn’t mean you should ignore them! Here’s the two ways to handle errors, one for await, one for using promises.</a:t>
-            </a:r>
-          </a:p>
-          <a:p>
-            <a:r>
-              <a:rPr lang="en-US" dirty="0"/>
-              <a:t>Common gotcha is that try/catch around a promise won’t catch async errors thrown by promise!</a:t>
-            </a:r>
-          </a:p>
-          <a:p>
-            <a:endParaRPr lang="en-US" dirty="0"/>
-          </a:p>
-          <a:p>
-            <a:r>
-              <a:rPr lang="en-US" dirty="0"/>
-              <a:t>Feel free to point out that, again, code on left and code on right are functionally equivalent, and the JS engine will generate code on right from code on left</a:t>
+              <a:t>Promises </a:t>
             </a:r>
           </a:p>
         </p:txBody>
@@ -2161,7 +2200,7 @@
     </p:spTree>
     <p:extLst>
       <p:ext uri="{BB962C8B-B14F-4D97-AF65-F5344CB8AC3E}">
-        <p14:creationId xmlns:p14="http://schemas.microsoft.com/office/powerpoint/2010/main" val="1067216613"/>
+        <p14:creationId xmlns:p14="http://schemas.microsoft.com/office/powerpoint/2010/main" val="2379886627"/>
       </p:ext>
     </p:extLst>
   </p:cSld>
@@ -2217,7 +2256,37 @@
           <a:p>
             <a:r>
               <a:rPr lang="en-US" dirty="0"/>
-              <a:t>In JS, only one computation (other than asynchronous IO) is running at a time, so statement 3 is guaranteed to run *immediately* after statement 2.</a:t>
+              <a:t>Here is a one-slide comparison of async/await and promises. You should be familiar with the “rules of the road” for async/await.</a:t>
+            </a:r>
+          </a:p>
+          <a:p>
+            <a:r>
+              <a:rPr lang="en-US" dirty="0"/>
+              <a:t>(read slide)</a:t>
+            </a:r>
+          </a:p>
+          <a:p>
+            <a:endParaRPr lang="en-US" dirty="0"/>
+          </a:p>
+          <a:p>
+            <a:r>
+              <a:rPr lang="en-US" dirty="0"/>
+              <a:t>We haven’t talked about error handling yet, but that doesn’t mean you should ignore them! Here’s the two ways to handle errors, one for await, one for using promises.</a:t>
+            </a:r>
+          </a:p>
+          <a:p>
+            <a:r>
+              <a:rPr lang="en-US" dirty="0"/>
+              <a:t>Common gotcha is that try/catch around a promise won’t catch async errors thrown by promise!</a:t>
+            </a:r>
+          </a:p>
+          <a:p>
+            <a:endParaRPr lang="en-US" dirty="0"/>
+          </a:p>
+          <a:p>
+            <a:r>
+              <a:rPr lang="en-US" dirty="0"/>
+              <a:t>Feel free to point out that, again, code on left and code on right are functionally equivalent, and the JS engine will generate code on right from code on left</a:t>
             </a:r>
           </a:p>
         </p:txBody>
@@ -2225,7 +2294,7 @@
     </p:spTree>
     <p:extLst>
       <p:ext uri="{BB962C8B-B14F-4D97-AF65-F5344CB8AC3E}">
-        <p14:creationId xmlns:p14="http://schemas.microsoft.com/office/powerpoint/2010/main" val="4154279858"/>
+        <p14:creationId xmlns:p14="http://schemas.microsoft.com/office/powerpoint/2010/main" val="1067216613"/>
       </p:ext>
     </p:extLst>
   </p:cSld>
@@ -2281,6 +2350,162 @@
           <a:p>
             <a:r>
               <a:rPr lang="en-US" dirty="0"/>
+              <a:t>In JS, only one computation (other than asynchronous IO) is running at a time, so statement 3 is guaranteed to run *immediately* after statement 2.</a:t>
+            </a:r>
+          </a:p>
+        </p:txBody>
+      </p:sp>
+    </p:spTree>
+    <p:extLst>
+      <p:ext uri="{BB962C8B-B14F-4D97-AF65-F5344CB8AC3E}">
+        <p14:creationId xmlns:p14="http://schemas.microsoft.com/office/powerpoint/2010/main" val="4154279858"/>
+      </p:ext>
+    </p:extLst>
+  </p:cSld>
+  <p:clrMapOvr>
+    <a:masterClrMapping/>
+  </p:clrMapOvr>
+</p:notes>
+</file>
+
+<file path=ppt/notesSlides/notesSlide28.xml><?xml version="1.0" encoding="utf-8"?>
+<p:notes xmlns:a="http://schemas.openxmlformats.org/drawingml/2006/main" xmlns:r="http://schemas.openxmlformats.org/officeDocument/2006/relationships" xmlns:p="http://schemas.openxmlformats.org/presentationml/2006/main">
+  <p:cSld>
+    <p:spTree>
+      <p:nvGrpSpPr>
+        <p:cNvPr id="1" name=""/>
+        <p:cNvGrpSpPr/>
+        <p:nvPr/>
+      </p:nvGrpSpPr>
+      <p:grpSpPr>
+        <a:xfrm>
+          <a:off x="0" y="0"/>
+          <a:ext cx="0" cy="0"/>
+          <a:chOff x="0" y="0"/>
+          <a:chExt cx="0" cy="0"/>
+        </a:xfrm>
+      </p:grpSpPr>
+      <p:sp>
+        <p:nvSpPr>
+          <p:cNvPr id="2" name="Slide Image Placeholder 1"/>
+          <p:cNvSpPr>
+            <a:spLocks noGrp="1" noRot="1" noChangeAspect="1"/>
+          </p:cNvSpPr>
+          <p:nvPr>
+            <p:ph type="sldImg"/>
+          </p:nvPr>
+        </p:nvSpPr>
+        <p:spPr/>
+      </p:sp>
+      <p:sp>
+        <p:nvSpPr>
+          <p:cNvPr id="3" name="Notes Placeholder 2"/>
+          <p:cNvSpPr>
+            <a:spLocks noGrp="1"/>
+          </p:cNvSpPr>
+          <p:nvPr>
+            <p:ph type="body" idx="1"/>
+          </p:nvPr>
+        </p:nvSpPr>
+        <p:spPr/>
+        <p:txBody>
+          <a:bodyPr/>
+          <a:lstStyle/>
+          <a:p>
+            <a:r>
+              <a:rPr lang="en-US" dirty="0"/>
+              <a:t>We said at the end of the last lecture that making a clock that ticks by itself was easy and that we would learn about it in the next lecture.  Well, here it is.</a:t>
+            </a:r>
+          </a:p>
+          <a:p>
+            <a:r>
+              <a:rPr lang="en-US" b="1" dirty="0" err="1"/>
+              <a:t>setInterval</a:t>
+            </a:r>
+            <a:r>
+              <a:rPr lang="en-US" b="1" dirty="0"/>
+              <a:t> </a:t>
+            </a:r>
+            <a:r>
+              <a:rPr lang="en-US" b="0" dirty="0"/>
+              <a:t>is one of the JS primitives that creates a concurrent computation.  Here, it creates a concurrent computation that ticks the clock every 50 </a:t>
+            </a:r>
+            <a:r>
+              <a:rPr lang="en-US" b="0" dirty="0" err="1"/>
+              <a:t>ms.</a:t>
+            </a:r>
+            <a:endParaRPr lang="en-US" b="0" dirty="0"/>
+          </a:p>
+          <a:p>
+            <a:r>
+              <a:rPr lang="en-US" b="0" dirty="0"/>
+              <a:t>We told you it was easy!</a:t>
+            </a:r>
+          </a:p>
+          <a:p>
+            <a:endParaRPr lang="en-US" b="1" dirty="0"/>
+          </a:p>
+        </p:txBody>
+      </p:sp>
+    </p:spTree>
+    <p:extLst>
+      <p:ext uri="{BB962C8B-B14F-4D97-AF65-F5344CB8AC3E}">
+        <p14:creationId xmlns:p14="http://schemas.microsoft.com/office/powerpoint/2010/main" val="752047573"/>
+      </p:ext>
+    </p:extLst>
+  </p:cSld>
+  <p:clrMapOvr>
+    <a:masterClrMapping/>
+  </p:clrMapOvr>
+</p:notes>
+</file>
+
+<file path=ppt/notesSlides/notesSlide29.xml><?xml version="1.0" encoding="utf-8"?>
+<p:notes xmlns:a="http://schemas.openxmlformats.org/drawingml/2006/main" xmlns:r="http://schemas.openxmlformats.org/officeDocument/2006/relationships" xmlns:p="http://schemas.openxmlformats.org/presentationml/2006/main">
+  <p:cSld>
+    <p:spTree>
+      <p:nvGrpSpPr>
+        <p:cNvPr id="1" name=""/>
+        <p:cNvGrpSpPr/>
+        <p:nvPr/>
+      </p:nvGrpSpPr>
+      <p:grpSpPr>
+        <a:xfrm>
+          <a:off x="0" y="0"/>
+          <a:ext cx="0" cy="0"/>
+          <a:chOff x="0" y="0"/>
+          <a:chExt cx="0" cy="0"/>
+        </a:xfrm>
+      </p:grpSpPr>
+      <p:sp>
+        <p:nvSpPr>
+          <p:cNvPr id="2" name="Slide Image Placeholder 1"/>
+          <p:cNvSpPr>
+            <a:spLocks noGrp="1" noRot="1" noChangeAspect="1"/>
+          </p:cNvSpPr>
+          <p:nvPr>
+            <p:ph type="sldImg"/>
+          </p:nvPr>
+        </p:nvSpPr>
+        <p:spPr/>
+      </p:sp>
+      <p:sp>
+        <p:nvSpPr>
+          <p:cNvPr id="3" name="Notes Placeholder 2"/>
+          <p:cNvSpPr>
+            <a:spLocks noGrp="1"/>
+          </p:cNvSpPr>
+          <p:nvPr>
+            <p:ph type="body" idx="1"/>
+          </p:nvPr>
+        </p:nvSpPr>
+        <p:spPr/>
+        <p:txBody>
+          <a:bodyPr/>
+          <a:lstStyle/>
+          <a:p>
+            <a:r>
+              <a:rPr lang="en-US" dirty="0"/>
               <a:t>&lt;read slide&gt;</a:t>
             </a:r>
           </a:p>
@@ -2303,7 +2528,7 @@
           <a:p>
             <a:fld id="{07937F07-1250-4CCE-B198-1B2887014F41}" type="slidenum">
               <a:rPr lang="en-US" smtClean="0"/>
-              <a:t>38</a:t>
+              <a:t>39</a:t>
             </a:fld>
             <a:endParaRPr lang="en-US"/>
           </a:p>
@@ -2472,21 +2697,20 @@
             </a:r>
           </a:p>
           <a:p>
-            <a:endParaRPr lang="en-US" dirty="0"/>
-          </a:p>
-          <a:p>
-            <a:r>
-              <a:rPr lang="en-US" dirty="0"/>
-              <a:t>&lt;Read slide, click to show the thread0 (build 1), thread1 (build 2), and sharing data (build 3)&gt;</a:t>
-            </a:r>
-          </a:p>
-          <a:p>
             <a:br>
               <a:rPr lang="en-US" dirty="0"/>
             </a:br>
             <a:r>
               <a:rPr lang="en-US" dirty="0"/>
-              <a:t>You might be familiar with this programming model. As it turns out, the “share data signal each other” part is extremely hard to get right, and almost impossible to prove correct</a:t>
+              <a:t>You might be familiar with this programming model. As it turns out, the “</a:t>
+            </a:r>
+            <a:r>
+              <a:rPr lang="en-US" dirty="0" err="1"/>
+              <a:t>interprocess</a:t>
+            </a:r>
+            <a:r>
+              <a:rPr lang="en-US" dirty="0"/>
+              <a:t> communication by shared memory” part is extremely hard to get right, and almost impossible to prove correct</a:t>
             </a:r>
           </a:p>
           <a:p>
@@ -2495,7 +2719,7 @@
           <a:p>
             <a:r>
               <a:rPr lang="en-US" dirty="0"/>
-              <a:t>This is not how we get asynchronous computation in JS or TS</a:t>
+              <a:t>This is not how JS or TS does asynchronous computation.</a:t>
             </a:r>
           </a:p>
         </p:txBody>
@@ -2557,14 +2781,17 @@
           <a:bodyPr/>
           <a:lstStyle/>
           <a:p>
-            <a:endParaRPr lang="en-US" dirty="0"/>
+            <a:r>
+              <a:rPr lang="en-US" dirty="0"/>
+              <a:t>In cooperative multiprocessing, each thread decides when it should yield to let other threads execute.</a:t>
+            </a:r>
           </a:p>
         </p:txBody>
       </p:sp>
     </p:spTree>
     <p:extLst>
       <p:ext uri="{BB962C8B-B14F-4D97-AF65-F5344CB8AC3E}">
-        <p14:creationId xmlns:p14="http://schemas.microsoft.com/office/powerpoint/2010/main" val="2409139581"/>
+        <p14:creationId xmlns:p14="http://schemas.microsoft.com/office/powerpoint/2010/main" val="2534470671"/>
       </p:ext>
     </p:extLst>
   </p:cSld>
@@ -2618,33 +2845,6 @@
           <a:bodyPr/>
           <a:lstStyle/>
           <a:p>
-            <a:r>
-              <a:rPr lang="en-US" dirty="0"/>
-              <a:t>Note:</a:t>
-            </a:r>
-          </a:p>
-          <a:p>
-            <a:r>
-              <a:rPr lang="en-US" dirty="0"/>
-              <a:t>When one request starts, this code proceeds to the next one.</a:t>
-            </a:r>
-          </a:p>
-          <a:p>
-            <a:r>
-              <a:rPr lang="en-US" dirty="0"/>
-              <a:t>The starting process ran to completion: the Console.log executed before the requests.</a:t>
-            </a:r>
-          </a:p>
-          <a:p>
-            <a:endParaRPr lang="en-US" dirty="0"/>
-          </a:p>
-          <a:p>
-            <a:r>
-              <a:rPr lang="en-US" dirty="0"/>
-              <a:t>Transmission is out-of-order:  Request 2 evidently reached the server before Request 1.</a:t>
-            </a:r>
-          </a:p>
-          <a:p>
             <a:endParaRPr lang="en-US" dirty="0"/>
           </a:p>
         </p:txBody>
@@ -2652,7 +2852,7 @@
     </p:spTree>
     <p:extLst>
       <p:ext uri="{BB962C8B-B14F-4D97-AF65-F5344CB8AC3E}">
-        <p14:creationId xmlns:p14="http://schemas.microsoft.com/office/powerpoint/2010/main" val="2432822581"/>
+        <p14:creationId xmlns:p14="http://schemas.microsoft.com/office/powerpoint/2010/main" val="2409139581"/>
       </p:ext>
     </p:extLst>
   </p:cSld>
@@ -2708,15 +2908,39 @@
           <a:p>
             <a:r>
               <a:rPr lang="en-US" dirty="0"/>
-              <a:t>Here, the caller waits for each request to finish before starting the next one.</a:t>
-            </a:r>
+              <a:t>Note:</a:t>
+            </a:r>
+          </a:p>
+          <a:p>
+            <a:r>
+              <a:rPr lang="en-US" dirty="0"/>
+              <a:t>When one request starts, this code proceeds to the next one.</a:t>
+            </a:r>
+          </a:p>
+          <a:p>
+            <a:r>
+              <a:rPr lang="en-US" dirty="0"/>
+              <a:t>The starting process ran to completion: the Console.log executed before the requests.</a:t>
+            </a:r>
+          </a:p>
+          <a:p>
+            <a:endParaRPr lang="en-US" dirty="0"/>
+          </a:p>
+          <a:p>
+            <a:r>
+              <a:rPr lang="en-US" dirty="0"/>
+              <a:t>Transmission is out-of-order:  Request 2 evidently reached the server before Request 1.</a:t>
+            </a:r>
+          </a:p>
+          <a:p>
+            <a:endParaRPr lang="en-US" dirty="0"/>
           </a:p>
         </p:txBody>
       </p:sp>
     </p:spTree>
     <p:extLst>
       <p:ext uri="{BB962C8B-B14F-4D97-AF65-F5344CB8AC3E}">
-        <p14:creationId xmlns:p14="http://schemas.microsoft.com/office/powerpoint/2010/main" val="2293380916"/>
+        <p14:creationId xmlns:p14="http://schemas.microsoft.com/office/powerpoint/2010/main" val="2432822581"/>
       </p:ext>
     </p:extLst>
   </p:cSld>
@@ -2772,7 +2996,7 @@
           <a:p>
             <a:r>
               <a:rPr lang="en-US" dirty="0"/>
-              <a:t>Here all three requests are sent out concurrently.  </a:t>
+              <a:t>Here, the caller waits for each request to finish before starting the next one.</a:t>
             </a:r>
           </a:p>
         </p:txBody>
@@ -2780,7 +3004,7 @@
     </p:spTree>
     <p:extLst>
       <p:ext uri="{BB962C8B-B14F-4D97-AF65-F5344CB8AC3E}">
-        <p14:creationId xmlns:p14="http://schemas.microsoft.com/office/powerpoint/2010/main" val="3329866587"/>
+        <p14:creationId xmlns:p14="http://schemas.microsoft.com/office/powerpoint/2010/main" val="2293380916"/>
       </p:ext>
     </p:extLst>
   </p:cSld>
@@ -2836,29 +3060,7 @@
           <a:p>
             <a:r>
               <a:rPr lang="en-US" dirty="0"/>
-              <a:t>We should leverage concurrency whenever possible. Again, in this example, it seems like it’s probably OK to make all of the requests at once, and then wait for the responses.</a:t>
-            </a:r>
-          </a:p>
-          <a:p>
-            <a:endParaRPr lang="en-US" dirty="0"/>
-          </a:p>
-          <a:p>
-            <a:r>
-              <a:rPr lang="en-US" dirty="0"/>
-              <a:t>Multiple “awaits” on left means (read slide)</a:t>
-            </a:r>
-          </a:p>
-          <a:p>
-            <a:endParaRPr lang="en-US" dirty="0"/>
-          </a:p>
-          <a:p>
-            <a:r>
-              <a:rPr lang="en-US" dirty="0" err="1"/>
-              <a:t>Promise.all</a:t>
-            </a:r>
-            <a:r>
-              <a:rPr lang="en-US" dirty="0"/>
-              <a:t> on right means (read slide)</a:t>
+              <a:t>Here all three requests are sent out concurrently.  </a:t>
             </a:r>
           </a:p>
         </p:txBody>
@@ -2866,7 +3068,7 @@
     </p:spTree>
     <p:extLst>
       <p:ext uri="{BB962C8B-B14F-4D97-AF65-F5344CB8AC3E}">
-        <p14:creationId xmlns:p14="http://schemas.microsoft.com/office/powerpoint/2010/main" val="2468432417"/>
+        <p14:creationId xmlns:p14="http://schemas.microsoft.com/office/powerpoint/2010/main" val="3329866587"/>
       </p:ext>
     </p:extLst>
   </p:cSld>
@@ -3079,7 +3281,7 @@
                 <a:tabLst/>
                 <a:defRPr/>
               </a:pPr>
-              <a:t>9/13/2022</a:t>
+              <a:t>9/20/2022</a:t>
             </a:fld>
             <a:endParaRPr kumimoji="0" lang="en-US" sz="1200" b="0" i="0" u="none" strike="noStrike" kern="1200" cap="none" spc="0" normalizeH="0" baseline="0" noProof="0">
               <a:ln>
@@ -3563,7 +3765,7 @@
                 <a:tabLst/>
                 <a:defRPr/>
               </a:pPr>
-              <a:t>9/13/2022</a:t>
+              <a:t>9/20/2022</a:t>
             </a:fld>
             <a:endParaRPr kumimoji="0" lang="en-US" sz="1200" b="0" i="0" u="none" strike="noStrike" kern="1200" cap="none" spc="0" normalizeH="0" baseline="0" noProof="0">
               <a:ln>
@@ -3921,7 +4123,7 @@
                 <a:tabLst/>
                 <a:defRPr/>
               </a:pPr>
-              <a:t>9/13/2022</a:t>
+              <a:t>9/20/2022</a:t>
             </a:fld>
             <a:endParaRPr kumimoji="0" lang="en-US" sz="1200" b="0" i="0" u="none" strike="noStrike" kern="1200" cap="none" spc="0" normalizeH="0" baseline="0" noProof="0">
               <a:ln>
@@ -4289,7 +4491,7 @@
                 <a:tabLst/>
                 <a:defRPr/>
               </a:pPr>
-              <a:t>9/13/2022</a:t>
+              <a:t>9/20/2022</a:t>
             </a:fld>
             <a:endParaRPr kumimoji="0" lang="en-US" sz="1200" b="0" i="0" u="none" strike="noStrike" kern="1200" cap="none" spc="0" normalizeH="0" baseline="0" noProof="0">
               <a:ln>
@@ -5255,7 +5457,7 @@
                 <a:tabLst/>
                 <a:defRPr/>
               </a:pPr>
-              <a:t>9/13/2022</a:t>
+              <a:t>9/20/2022</a:t>
             </a:fld>
             <a:endParaRPr kumimoji="0" lang="en-US" sz="1200" b="0" i="0" u="none" strike="noStrike" kern="1200" cap="none" spc="0" normalizeH="0" baseline="0" noProof="0">
               <a:ln>
@@ -5665,7 +5867,7 @@
                 <a:tabLst/>
                 <a:defRPr/>
               </a:pPr>
-              <a:t>9/13/2022</a:t>
+              <a:t>9/20/2022</a:t>
             </a:fld>
             <a:endParaRPr kumimoji="0" lang="en-US" sz="1200" b="0" i="0" u="none" strike="noStrike" kern="1200" cap="none" spc="0" normalizeH="0" baseline="0" noProof="0">
               <a:ln>
@@ -6007,7 +6209,7 @@
                 <a:tabLst/>
                 <a:defRPr/>
               </a:pPr>
-              <a:t>9/13/2022</a:t>
+              <a:t>9/20/2022</a:t>
             </a:fld>
             <a:endParaRPr kumimoji="0" lang="en-US" sz="1200" b="0" i="0" u="none" strike="noStrike" kern="1200" cap="none" spc="0" normalizeH="0" baseline="0" noProof="0">
               <a:ln>
@@ -6480,7 +6682,7 @@
                 <a:tabLst/>
                 <a:defRPr/>
               </a:pPr>
-              <a:t>9/13/2022</a:t>
+              <a:t>9/20/2022</a:t>
             </a:fld>
             <a:endParaRPr kumimoji="0" lang="en-US" sz="1200" b="0" i="0" u="none" strike="noStrike" kern="1200" cap="none" spc="0" normalizeH="0" baseline="0" noProof="0">
               <a:ln>
@@ -6941,7 +7143,7 @@
                 <a:tabLst/>
                 <a:defRPr/>
               </a:pPr>
-              <a:t>9/13/2022</a:t>
+              <a:t>9/20/2022</a:t>
             </a:fld>
             <a:endParaRPr kumimoji="0" lang="en-US" sz="1200" b="0" i="0" u="none" strike="noStrike" kern="1200" cap="none" spc="0" normalizeH="0" baseline="0" noProof="0">
               <a:ln>
@@ -7549,7 +7751,7 @@
                 <a:tabLst/>
                 <a:defRPr/>
               </a:pPr>
-              <a:t>9/13/2022</a:t>
+              <a:t>9/20/2022</a:t>
             </a:fld>
             <a:endParaRPr kumimoji="0" lang="en-US" sz="1200" b="0" i="0" u="none" strike="noStrike" kern="1200" cap="none" spc="0" normalizeH="0" baseline="0" noProof="0">
               <a:ln>
@@ -7822,7 +8024,7 @@
                 <a:tabLst/>
                 <a:defRPr/>
               </a:pPr>
-              <a:t>9/13/2022</a:t>
+              <a:t>9/20/2022</a:t>
             </a:fld>
             <a:endParaRPr kumimoji="0" lang="en-US" sz="1200" b="0" i="0" u="none" strike="noStrike" kern="1200" cap="none" spc="0" normalizeH="0" baseline="0" noProof="0">
               <a:ln>
@@ -8293,7 +8495,7 @@
                 <a:tabLst/>
                 <a:defRPr/>
               </a:pPr>
-              <a:t>9/13/2022</a:t>
+              <a:t>9/20/2022</a:t>
             </a:fld>
             <a:endParaRPr kumimoji="0" lang="en-US" sz="1200" b="0" i="0" u="none" strike="noStrike" kern="1200" cap="none" spc="0" normalizeH="0" baseline="0" noProof="0">
               <a:ln>
@@ -8694,7 +8896,7 @@
                 <a:tabLst/>
                 <a:defRPr/>
               </a:pPr>
-              <a:t>9/13/2022</a:t>
+              <a:t>9/20/2022</a:t>
             </a:fld>
             <a:endParaRPr kumimoji="0" lang="en-US" sz="1200" b="0" i="0" u="none" strike="noStrike" kern="1200" cap="none" spc="0" normalizeH="0" baseline="0" noProof="0">
               <a:ln>
@@ -13091,7 +13293,7 @@
           </a:ln>
           <a:extLst>
             <a:ext uri="{C572A759-6A51-4108-AA02-DFA0A04FC94B}">
-              <ma14:wrappingTextBoxFlag xmlns:ma14="http://schemas.microsoft.com/office/mac/drawingml/2011/main" xmlns:a14="http://schemas.microsoft.com/office/drawing/2010/main" xmlns:m="http://schemas.openxmlformats.org/officeDocument/2006/math" xmlns="" val="1"/>
+              <ma14:wrappingTextBoxFlag xmlns="" xmlns:m="http://schemas.openxmlformats.org/officeDocument/2006/math" xmlns:a14="http://schemas.microsoft.com/office/drawing/2010/main" xmlns:ma14="http://schemas.microsoft.com/office/mac/drawingml/2011/main" val="1"/>
             </a:ext>
           </a:extLst>
         </p:spPr>
@@ -13680,7 +13882,7 @@
           </a:ln>
           <a:extLst>
             <a:ext uri="{C572A759-6A51-4108-AA02-DFA0A04FC94B}">
-              <ma14:wrappingTextBoxFlag xmlns:ma14="http://schemas.microsoft.com/office/mac/drawingml/2011/main" xmlns:a14="http://schemas.microsoft.com/office/drawing/2010/main" xmlns:m="http://schemas.openxmlformats.org/officeDocument/2006/math" xmlns="" val="1"/>
+              <ma14:wrappingTextBoxFlag xmlns="" xmlns:m="http://schemas.openxmlformats.org/officeDocument/2006/math" xmlns:a14="http://schemas.microsoft.com/office/drawing/2010/main" xmlns:ma14="http://schemas.microsoft.com/office/mac/drawingml/2011/main" val="1"/>
             </a:ext>
           </a:extLst>
         </p:spPr>
@@ -14881,7 +15083,7 @@
             <a:effectLst/>
             <a:extLst>
               <a:ext uri="{C572A759-6A51-4108-AA02-DFA0A04FC94B}">
-                <ma14:wrappingTextBoxFlag xmlns:ma14="http://schemas.microsoft.com/office/mac/drawingml/2011/main" xmlns:a14="http://schemas.microsoft.com/office/drawing/2010/main" xmlns:m="http://schemas.openxmlformats.org/officeDocument/2006/math" xmlns="" val="1"/>
+                <ma14:wrappingTextBoxFlag xmlns="" xmlns:m="http://schemas.openxmlformats.org/officeDocument/2006/math" xmlns:a14="http://schemas.microsoft.com/office/drawing/2010/main" xmlns:ma14="http://schemas.microsoft.com/office/mac/drawingml/2011/main" val="1"/>
               </a:ext>
             </a:extLst>
           </p:spPr>
@@ -14950,7 +15152,7 @@
             <a:effectLst/>
             <a:extLst>
               <a:ext uri="{C572A759-6A51-4108-AA02-DFA0A04FC94B}">
-                <ma14:wrappingTextBoxFlag xmlns:ma14="http://schemas.microsoft.com/office/mac/drawingml/2011/main" xmlns:a14="http://schemas.microsoft.com/office/drawing/2010/main" xmlns:m="http://schemas.openxmlformats.org/officeDocument/2006/math" xmlns="" val="1"/>
+                <ma14:wrappingTextBoxFlag xmlns="" xmlns:m="http://schemas.openxmlformats.org/officeDocument/2006/math" xmlns:a14="http://schemas.microsoft.com/office/drawing/2010/main" xmlns:ma14="http://schemas.microsoft.com/office/mac/drawingml/2011/main" val="1"/>
               </a:ext>
             </a:extLst>
           </p:spPr>
@@ -15016,7 +15218,7 @@
             </a:ln>
             <a:extLst>
               <a:ext uri="{C572A759-6A51-4108-AA02-DFA0A04FC94B}">
-                <ma14:wrappingTextBoxFlag xmlns:ma14="http://schemas.microsoft.com/office/mac/drawingml/2011/main" xmlns:a14="http://schemas.microsoft.com/office/drawing/2010/main" xmlns:m="http://schemas.openxmlformats.org/officeDocument/2006/math" xmlns="" val="1"/>
+                <ma14:wrappingTextBoxFlag xmlns="" xmlns:m="http://schemas.openxmlformats.org/officeDocument/2006/math" xmlns:a14="http://schemas.microsoft.com/office/drawing/2010/main" xmlns:ma14="http://schemas.microsoft.com/office/mac/drawingml/2011/main" val="1"/>
               </a:ext>
             </a:extLst>
           </p:spPr>
@@ -15074,7 +15276,7 @@
             </a:ln>
             <a:extLst>
               <a:ext uri="{C572A759-6A51-4108-AA02-DFA0A04FC94B}">
-                <ma14:wrappingTextBoxFlag xmlns:ma14="http://schemas.microsoft.com/office/mac/drawingml/2011/main" xmlns:a14="http://schemas.microsoft.com/office/drawing/2010/main" xmlns:m="http://schemas.openxmlformats.org/officeDocument/2006/math" xmlns="" val="1"/>
+                <ma14:wrappingTextBoxFlag xmlns="" xmlns:m="http://schemas.openxmlformats.org/officeDocument/2006/math" xmlns:a14="http://schemas.microsoft.com/office/drawing/2010/main" xmlns:ma14="http://schemas.microsoft.com/office/mac/drawingml/2011/main" val="1"/>
               </a:ext>
             </a:extLst>
           </p:spPr>
@@ -15155,7 +15357,7 @@
             <a:effectLst/>
             <a:extLst>
               <a:ext uri="{C572A759-6A51-4108-AA02-DFA0A04FC94B}">
-                <ma14:wrappingTextBoxFlag xmlns:ma14="http://schemas.microsoft.com/office/mac/drawingml/2011/main" xmlns:a14="http://schemas.microsoft.com/office/drawing/2010/main" xmlns:m="http://schemas.openxmlformats.org/officeDocument/2006/math" xmlns="" val="1"/>
+                <ma14:wrappingTextBoxFlag xmlns="" xmlns:m="http://schemas.openxmlformats.org/officeDocument/2006/math" xmlns:a14="http://schemas.microsoft.com/office/drawing/2010/main" xmlns:ma14="http://schemas.microsoft.com/office/mac/drawingml/2011/main" val="1"/>
               </a:ext>
             </a:extLst>
           </p:spPr>
@@ -15228,7 +15430,7 @@
             <a:effectLst/>
             <a:extLst>
               <a:ext uri="{C572A759-6A51-4108-AA02-DFA0A04FC94B}">
-                <ma14:wrappingTextBoxFlag xmlns:ma14="http://schemas.microsoft.com/office/mac/drawingml/2011/main" xmlns:a14="http://schemas.microsoft.com/office/drawing/2010/main" xmlns:m="http://schemas.openxmlformats.org/officeDocument/2006/math" xmlns="" val="1"/>
+                <ma14:wrappingTextBoxFlag xmlns="" xmlns:m="http://schemas.openxmlformats.org/officeDocument/2006/math" xmlns:a14="http://schemas.microsoft.com/office/drawing/2010/main" xmlns:ma14="http://schemas.microsoft.com/office/mac/drawingml/2011/main" val="1"/>
               </a:ext>
             </a:extLst>
           </p:spPr>
@@ -15294,7 +15496,7 @@
             </a:ln>
             <a:extLst>
               <a:ext uri="{C572A759-6A51-4108-AA02-DFA0A04FC94B}">
-                <ma14:wrappingTextBoxFlag xmlns:ma14="http://schemas.microsoft.com/office/mac/drawingml/2011/main" xmlns:a14="http://schemas.microsoft.com/office/drawing/2010/main" xmlns:m="http://schemas.openxmlformats.org/officeDocument/2006/math" xmlns="" val="1"/>
+                <ma14:wrappingTextBoxFlag xmlns="" xmlns:m="http://schemas.openxmlformats.org/officeDocument/2006/math" xmlns:a14="http://schemas.microsoft.com/office/drawing/2010/main" xmlns:ma14="http://schemas.microsoft.com/office/mac/drawingml/2011/main" val="1"/>
               </a:ext>
             </a:extLst>
           </p:spPr>
@@ -15352,7 +15554,7 @@
             </a:ln>
             <a:extLst>
               <a:ext uri="{C572A759-6A51-4108-AA02-DFA0A04FC94B}">
-                <ma14:wrappingTextBoxFlag xmlns:ma14="http://schemas.microsoft.com/office/mac/drawingml/2011/main" xmlns:a14="http://schemas.microsoft.com/office/drawing/2010/main" xmlns:m="http://schemas.openxmlformats.org/officeDocument/2006/math" xmlns="" val="1"/>
+                <ma14:wrappingTextBoxFlag xmlns="" xmlns:m="http://schemas.openxmlformats.org/officeDocument/2006/math" xmlns:a14="http://schemas.microsoft.com/office/drawing/2010/main" xmlns:ma14="http://schemas.microsoft.com/office/mac/drawingml/2011/main" val="1"/>
               </a:ext>
             </a:extLst>
           </p:spPr>
@@ -15433,7 +15635,7 @@
             <a:effectLst/>
             <a:extLst>
               <a:ext uri="{C572A759-6A51-4108-AA02-DFA0A04FC94B}">
-                <ma14:wrappingTextBoxFlag xmlns:ma14="http://schemas.microsoft.com/office/mac/drawingml/2011/main" xmlns:a14="http://schemas.microsoft.com/office/drawing/2010/main" xmlns:m="http://schemas.openxmlformats.org/officeDocument/2006/math" xmlns="" val="1"/>
+                <ma14:wrappingTextBoxFlag xmlns="" xmlns:m="http://schemas.openxmlformats.org/officeDocument/2006/math" xmlns:a14="http://schemas.microsoft.com/office/drawing/2010/main" xmlns:ma14="http://schemas.microsoft.com/office/mac/drawingml/2011/main" val="1"/>
               </a:ext>
             </a:extLst>
           </p:spPr>
@@ -15506,7 +15708,7 @@
             <a:effectLst/>
             <a:extLst>
               <a:ext uri="{C572A759-6A51-4108-AA02-DFA0A04FC94B}">
-                <ma14:wrappingTextBoxFlag xmlns:ma14="http://schemas.microsoft.com/office/mac/drawingml/2011/main" xmlns:a14="http://schemas.microsoft.com/office/drawing/2010/main" xmlns:m="http://schemas.openxmlformats.org/officeDocument/2006/math" xmlns="" val="1"/>
+                <ma14:wrappingTextBoxFlag xmlns="" xmlns:m="http://schemas.openxmlformats.org/officeDocument/2006/math" xmlns:a14="http://schemas.microsoft.com/office/drawing/2010/main" xmlns:ma14="http://schemas.microsoft.com/office/mac/drawingml/2011/main" val="1"/>
               </a:ext>
             </a:extLst>
           </p:spPr>
@@ -15572,7 +15774,7 @@
             </a:ln>
             <a:extLst>
               <a:ext uri="{C572A759-6A51-4108-AA02-DFA0A04FC94B}">
-                <ma14:wrappingTextBoxFlag xmlns:ma14="http://schemas.microsoft.com/office/mac/drawingml/2011/main" xmlns:a14="http://schemas.microsoft.com/office/drawing/2010/main" xmlns:m="http://schemas.openxmlformats.org/officeDocument/2006/math" xmlns="" val="1"/>
+                <ma14:wrappingTextBoxFlag xmlns="" xmlns:m="http://schemas.openxmlformats.org/officeDocument/2006/math" xmlns:a14="http://schemas.microsoft.com/office/drawing/2010/main" xmlns:ma14="http://schemas.microsoft.com/office/mac/drawingml/2011/main" val="1"/>
               </a:ext>
             </a:extLst>
           </p:spPr>
@@ -15630,7 +15832,7 @@
             </a:ln>
             <a:extLst>
               <a:ext uri="{C572A759-6A51-4108-AA02-DFA0A04FC94B}">
-                <ma14:wrappingTextBoxFlag xmlns:ma14="http://schemas.microsoft.com/office/mac/drawingml/2011/main" xmlns:a14="http://schemas.microsoft.com/office/drawing/2010/main" xmlns:m="http://schemas.openxmlformats.org/officeDocument/2006/math" xmlns="" val="1"/>
+                <ma14:wrappingTextBoxFlag xmlns="" xmlns:m="http://schemas.openxmlformats.org/officeDocument/2006/math" xmlns:a14="http://schemas.microsoft.com/office/drawing/2010/main" xmlns:ma14="http://schemas.microsoft.com/office/mac/drawingml/2011/main" val="1"/>
               </a:ext>
             </a:extLst>
           </p:spPr>
@@ -15711,7 +15913,7 @@
             <a:effectLst/>
             <a:extLst>
               <a:ext uri="{C572A759-6A51-4108-AA02-DFA0A04FC94B}">
-                <ma14:wrappingTextBoxFlag xmlns:ma14="http://schemas.microsoft.com/office/mac/drawingml/2011/main" xmlns:a14="http://schemas.microsoft.com/office/drawing/2010/main" xmlns:m="http://schemas.openxmlformats.org/officeDocument/2006/math" xmlns="" val="1"/>
+                <ma14:wrappingTextBoxFlag xmlns="" xmlns:m="http://schemas.openxmlformats.org/officeDocument/2006/math" xmlns:a14="http://schemas.microsoft.com/office/drawing/2010/main" xmlns:ma14="http://schemas.microsoft.com/office/mac/drawingml/2011/main" val="1"/>
               </a:ext>
             </a:extLst>
           </p:spPr>
@@ -15780,7 +15982,7 @@
             <a:effectLst/>
             <a:extLst>
               <a:ext uri="{C572A759-6A51-4108-AA02-DFA0A04FC94B}">
-                <ma14:wrappingTextBoxFlag xmlns:ma14="http://schemas.microsoft.com/office/mac/drawingml/2011/main" xmlns:a14="http://schemas.microsoft.com/office/drawing/2010/main" xmlns:m="http://schemas.openxmlformats.org/officeDocument/2006/math" xmlns="" val="1"/>
+                <ma14:wrappingTextBoxFlag xmlns="" xmlns:m="http://schemas.openxmlformats.org/officeDocument/2006/math" xmlns:a14="http://schemas.microsoft.com/office/drawing/2010/main" xmlns:ma14="http://schemas.microsoft.com/office/mac/drawingml/2011/main" val="1"/>
               </a:ext>
             </a:extLst>
           </p:spPr>
@@ -15846,7 +16048,7 @@
             </a:ln>
             <a:extLst>
               <a:ext uri="{C572A759-6A51-4108-AA02-DFA0A04FC94B}">
-                <ma14:wrappingTextBoxFlag xmlns:ma14="http://schemas.microsoft.com/office/mac/drawingml/2011/main" xmlns:a14="http://schemas.microsoft.com/office/drawing/2010/main" xmlns:m="http://schemas.openxmlformats.org/officeDocument/2006/math" xmlns="" val="1"/>
+                <ma14:wrappingTextBoxFlag xmlns="" xmlns:m="http://schemas.openxmlformats.org/officeDocument/2006/math" xmlns:a14="http://schemas.microsoft.com/office/drawing/2010/main" xmlns:ma14="http://schemas.microsoft.com/office/mac/drawingml/2011/main" val="1"/>
               </a:ext>
             </a:extLst>
           </p:spPr>
@@ -15904,7 +16106,7 @@
             </a:ln>
             <a:extLst>
               <a:ext uri="{C572A759-6A51-4108-AA02-DFA0A04FC94B}">
-                <ma14:wrappingTextBoxFlag xmlns:ma14="http://schemas.microsoft.com/office/mac/drawingml/2011/main" xmlns:a14="http://schemas.microsoft.com/office/drawing/2010/main" xmlns:m="http://schemas.openxmlformats.org/officeDocument/2006/math" xmlns="" val="1"/>
+                <ma14:wrappingTextBoxFlag xmlns="" xmlns:m="http://schemas.openxmlformats.org/officeDocument/2006/math" xmlns:a14="http://schemas.microsoft.com/office/drawing/2010/main" xmlns:ma14="http://schemas.microsoft.com/office/mac/drawingml/2011/main" val="1"/>
               </a:ext>
             </a:extLst>
           </p:spPr>
@@ -15985,7 +16187,7 @@
             <a:effectLst/>
             <a:extLst>
               <a:ext uri="{C572A759-6A51-4108-AA02-DFA0A04FC94B}">
-                <ma14:wrappingTextBoxFlag xmlns:ma14="http://schemas.microsoft.com/office/mac/drawingml/2011/main" xmlns:a14="http://schemas.microsoft.com/office/drawing/2010/main" xmlns:m="http://schemas.openxmlformats.org/officeDocument/2006/math" xmlns="" val="1"/>
+                <ma14:wrappingTextBoxFlag xmlns="" xmlns:m="http://schemas.openxmlformats.org/officeDocument/2006/math" xmlns:a14="http://schemas.microsoft.com/office/drawing/2010/main" xmlns:ma14="http://schemas.microsoft.com/office/mac/drawingml/2011/main" val="1"/>
               </a:ext>
             </a:extLst>
           </p:spPr>
@@ -16058,7 +16260,7 @@
             <a:effectLst/>
             <a:extLst>
               <a:ext uri="{C572A759-6A51-4108-AA02-DFA0A04FC94B}">
-                <ma14:wrappingTextBoxFlag xmlns:ma14="http://schemas.microsoft.com/office/mac/drawingml/2011/main" xmlns:a14="http://schemas.microsoft.com/office/drawing/2010/main" xmlns:m="http://schemas.openxmlformats.org/officeDocument/2006/math" xmlns="" val="1"/>
+                <ma14:wrappingTextBoxFlag xmlns="" xmlns:m="http://schemas.openxmlformats.org/officeDocument/2006/math" xmlns:a14="http://schemas.microsoft.com/office/drawing/2010/main" xmlns:ma14="http://schemas.microsoft.com/office/mac/drawingml/2011/main" val="1"/>
               </a:ext>
             </a:extLst>
           </p:spPr>
@@ -16124,7 +16326,7 @@
             </a:ln>
             <a:extLst>
               <a:ext uri="{C572A759-6A51-4108-AA02-DFA0A04FC94B}">
-                <ma14:wrappingTextBoxFlag xmlns:ma14="http://schemas.microsoft.com/office/mac/drawingml/2011/main" xmlns:a14="http://schemas.microsoft.com/office/drawing/2010/main" xmlns:m="http://schemas.openxmlformats.org/officeDocument/2006/math" xmlns="" val="1"/>
+                <ma14:wrappingTextBoxFlag xmlns="" xmlns:m="http://schemas.openxmlformats.org/officeDocument/2006/math" xmlns:a14="http://schemas.microsoft.com/office/drawing/2010/main" xmlns:ma14="http://schemas.microsoft.com/office/mac/drawingml/2011/main" val="1"/>
               </a:ext>
             </a:extLst>
           </p:spPr>
@@ -16182,7 +16384,7 @@
             </a:ln>
             <a:extLst>
               <a:ext uri="{C572A759-6A51-4108-AA02-DFA0A04FC94B}">
-                <ma14:wrappingTextBoxFlag xmlns:ma14="http://schemas.microsoft.com/office/mac/drawingml/2011/main" xmlns:a14="http://schemas.microsoft.com/office/drawing/2010/main" xmlns:m="http://schemas.openxmlformats.org/officeDocument/2006/math" xmlns="" val="1"/>
+                <ma14:wrappingTextBoxFlag xmlns="" xmlns:m="http://schemas.openxmlformats.org/officeDocument/2006/math" xmlns:a14="http://schemas.microsoft.com/office/drawing/2010/main" xmlns:ma14="http://schemas.microsoft.com/office/mac/drawingml/2011/main" val="1"/>
               </a:ext>
             </a:extLst>
           </p:spPr>
@@ -16263,7 +16465,7 @@
             <a:effectLst/>
             <a:extLst>
               <a:ext uri="{C572A759-6A51-4108-AA02-DFA0A04FC94B}">
-                <ma14:wrappingTextBoxFlag xmlns:ma14="http://schemas.microsoft.com/office/mac/drawingml/2011/main" xmlns:a14="http://schemas.microsoft.com/office/drawing/2010/main" xmlns:m="http://schemas.openxmlformats.org/officeDocument/2006/math" xmlns="" val="1"/>
+                <ma14:wrappingTextBoxFlag xmlns="" xmlns:m="http://schemas.openxmlformats.org/officeDocument/2006/math" xmlns:a14="http://schemas.microsoft.com/office/drawing/2010/main" xmlns:ma14="http://schemas.microsoft.com/office/mac/drawingml/2011/main" val="1"/>
               </a:ext>
             </a:extLst>
           </p:spPr>
@@ -16336,7 +16538,7 @@
             <a:effectLst/>
             <a:extLst>
               <a:ext uri="{C572A759-6A51-4108-AA02-DFA0A04FC94B}">
-                <ma14:wrappingTextBoxFlag xmlns:ma14="http://schemas.microsoft.com/office/mac/drawingml/2011/main" xmlns:a14="http://schemas.microsoft.com/office/drawing/2010/main" xmlns:m="http://schemas.openxmlformats.org/officeDocument/2006/math" xmlns="" val="1"/>
+                <ma14:wrappingTextBoxFlag xmlns="" xmlns:m="http://schemas.openxmlformats.org/officeDocument/2006/math" xmlns:a14="http://schemas.microsoft.com/office/drawing/2010/main" xmlns:ma14="http://schemas.microsoft.com/office/mac/drawingml/2011/main" val="1"/>
               </a:ext>
             </a:extLst>
           </p:spPr>
@@ -16402,7 +16604,7 @@
             </a:ln>
             <a:extLst>
               <a:ext uri="{C572A759-6A51-4108-AA02-DFA0A04FC94B}">
-                <ma14:wrappingTextBoxFlag xmlns:ma14="http://schemas.microsoft.com/office/mac/drawingml/2011/main" xmlns:a14="http://schemas.microsoft.com/office/drawing/2010/main" xmlns:m="http://schemas.openxmlformats.org/officeDocument/2006/math" xmlns="" val="1"/>
+                <ma14:wrappingTextBoxFlag xmlns="" xmlns:m="http://schemas.openxmlformats.org/officeDocument/2006/math" xmlns:a14="http://schemas.microsoft.com/office/drawing/2010/main" xmlns:ma14="http://schemas.microsoft.com/office/mac/drawingml/2011/main" val="1"/>
               </a:ext>
             </a:extLst>
           </p:spPr>
@@ -16460,7 +16662,7 @@
             </a:ln>
             <a:extLst>
               <a:ext uri="{C572A759-6A51-4108-AA02-DFA0A04FC94B}">
-                <ma14:wrappingTextBoxFlag xmlns:ma14="http://schemas.microsoft.com/office/mac/drawingml/2011/main" xmlns:a14="http://schemas.microsoft.com/office/drawing/2010/main" xmlns:m="http://schemas.openxmlformats.org/officeDocument/2006/math" xmlns="" val="1"/>
+                <ma14:wrappingTextBoxFlag xmlns="" xmlns:m="http://schemas.openxmlformats.org/officeDocument/2006/math" xmlns:a14="http://schemas.microsoft.com/office/drawing/2010/main" xmlns:ma14="http://schemas.microsoft.com/office/mac/drawingml/2011/main" val="1"/>
               </a:ext>
             </a:extLst>
           </p:spPr>
@@ -16519,7 +16721,7 @@
           </a:ln>
           <a:extLst>
             <a:ext uri="{C572A759-6A51-4108-AA02-DFA0A04FC94B}">
-              <ma14:wrappingTextBoxFlag xmlns:ma14="http://schemas.microsoft.com/office/mac/drawingml/2011/main" xmlns:a14="http://schemas.microsoft.com/office/drawing/2010/main" xmlns:m="http://schemas.openxmlformats.org/officeDocument/2006/math" xmlns="" val="1"/>
+              <ma14:wrappingTextBoxFlag xmlns="" xmlns:m="http://schemas.openxmlformats.org/officeDocument/2006/math" xmlns:a14="http://schemas.microsoft.com/office/drawing/2010/main" xmlns:ma14="http://schemas.microsoft.com/office/mac/drawingml/2011/main" val="1"/>
             </a:ext>
           </a:extLst>
         </p:spPr>
@@ -16577,7 +16779,7 @@
           </a:ln>
           <a:extLst>
             <a:ext uri="{C572A759-6A51-4108-AA02-DFA0A04FC94B}">
-              <ma14:wrappingTextBoxFlag xmlns:ma14="http://schemas.microsoft.com/office/mac/drawingml/2011/main" xmlns:a14="http://schemas.microsoft.com/office/drawing/2010/main" xmlns:m="http://schemas.openxmlformats.org/officeDocument/2006/math" xmlns="" val="1"/>
+              <ma14:wrappingTextBoxFlag xmlns="" xmlns:m="http://schemas.openxmlformats.org/officeDocument/2006/math" xmlns:a14="http://schemas.microsoft.com/office/drawing/2010/main" xmlns:ma14="http://schemas.microsoft.com/office/mac/drawingml/2011/main" val="1"/>
             </a:ext>
           </a:extLst>
         </p:spPr>
@@ -16821,7 +17023,7 @@
             </a:ln>
             <a:extLst>
               <a:ext uri="{C572A759-6A51-4108-AA02-DFA0A04FC94B}">
-                <ma14:wrappingTextBoxFlag xmlns:ma14="http://schemas.microsoft.com/office/mac/drawingml/2011/main" xmlns:a14="http://schemas.microsoft.com/office/drawing/2010/main" xmlns:m="http://schemas.openxmlformats.org/officeDocument/2006/math" xmlns="" val="1"/>
+                <ma14:wrappingTextBoxFlag xmlns="" xmlns:m="http://schemas.openxmlformats.org/officeDocument/2006/math" xmlns:a14="http://schemas.microsoft.com/office/drawing/2010/main" xmlns:ma14="http://schemas.microsoft.com/office/mac/drawingml/2011/main" val="1"/>
               </a:ext>
             </a:extLst>
           </p:spPr>
@@ -17373,7 +17575,7 @@
             </a:ln>
             <a:extLst>
               <a:ext uri="{C572A759-6A51-4108-AA02-DFA0A04FC94B}">
-                <ma14:wrappingTextBoxFlag xmlns:ma14="http://schemas.microsoft.com/office/mac/drawingml/2011/main" xmlns:a14="http://schemas.microsoft.com/office/drawing/2010/main" xmlns:m="http://schemas.openxmlformats.org/officeDocument/2006/math" xmlns="" val="1"/>
+                <ma14:wrappingTextBoxFlag xmlns="" xmlns:m="http://schemas.openxmlformats.org/officeDocument/2006/math" xmlns:a14="http://schemas.microsoft.com/office/drawing/2010/main" xmlns:ma14="http://schemas.microsoft.com/office/mac/drawingml/2011/main" val="1"/>
               </a:ext>
             </a:extLst>
           </p:spPr>
@@ -18596,7 +18798,7 @@
           </a:prstGeom>
           <a:extLst>
             <a:ext uri="{C572A759-6A51-4108-AA02-DFA0A04FC94B}">
-              <ma14:wrappingTextBoxFlag xmlns:ma14="http://schemas.microsoft.com/office/mac/drawingml/2011/main" xmlns:a14="http://schemas.microsoft.com/office/drawing/2010/main" xmlns:m="http://schemas.openxmlformats.org/officeDocument/2006/math" xmlns="" val="1"/>
+              <ma14:wrappingTextBoxFlag xmlns="" xmlns:m="http://schemas.openxmlformats.org/officeDocument/2006/math" xmlns:a14="http://schemas.microsoft.com/office/drawing/2010/main" xmlns:ma14="http://schemas.microsoft.com/office/mac/drawingml/2011/main" val="1"/>
             </a:ext>
           </a:extLst>
         </p:spPr>
@@ -19343,7 +19545,7 @@
             <a:effectLst/>
             <a:extLst>
               <a:ext uri="{C572A759-6A51-4108-AA02-DFA0A04FC94B}">
-                <ma14:wrappingTextBoxFlag xmlns="" xmlns:m="http://schemas.openxmlformats.org/officeDocument/2006/math" xmlns:a14="http://schemas.microsoft.com/office/drawing/2010/main" xmlns:ma14="http://schemas.microsoft.com/office/mac/drawingml/2011/main" val="1"/>
+                <ma14:wrappingTextBoxFlag xmlns:ma14="http://schemas.microsoft.com/office/mac/drawingml/2011/main" xmlns:a14="http://schemas.microsoft.com/office/drawing/2010/main" xmlns:m="http://schemas.openxmlformats.org/officeDocument/2006/math" xmlns="" val="1"/>
               </a:ext>
             </a:extLst>
           </p:spPr>
@@ -19626,7 +19828,7 @@
             <a:effectLst/>
             <a:extLst>
               <a:ext uri="{C572A759-6A51-4108-AA02-DFA0A04FC94B}">
-                <ma14:wrappingTextBoxFlag xmlns="" xmlns:m="http://schemas.openxmlformats.org/officeDocument/2006/math" xmlns:a14="http://schemas.microsoft.com/office/drawing/2010/main" xmlns:ma14="http://schemas.microsoft.com/office/mac/drawingml/2011/main" val="1"/>
+                <ma14:wrappingTextBoxFlag xmlns:ma14="http://schemas.microsoft.com/office/mac/drawingml/2011/main" xmlns:a14="http://schemas.microsoft.com/office/drawing/2010/main" xmlns:m="http://schemas.openxmlformats.org/officeDocument/2006/math" xmlns="" val="1"/>
               </a:ext>
             </a:extLst>
           </p:spPr>
@@ -20760,7 +20962,7 @@
             <a:effectLst/>
             <a:extLst>
               <a:ext uri="{C572A759-6A51-4108-AA02-DFA0A04FC94B}">
-                <ma14:wrappingTextBoxFlag xmlns:ma14="http://schemas.microsoft.com/office/mac/drawingml/2011/main" xmlns:a14="http://schemas.microsoft.com/office/drawing/2010/main" xmlns:m="http://schemas.openxmlformats.org/officeDocument/2006/math" xmlns="" val="1"/>
+                <ma14:wrappingTextBoxFlag xmlns="" xmlns:m="http://schemas.openxmlformats.org/officeDocument/2006/math" xmlns:a14="http://schemas.microsoft.com/office/drawing/2010/main" xmlns:ma14="http://schemas.microsoft.com/office/mac/drawingml/2011/main" val="1"/>
               </a:ext>
             </a:extLst>
           </p:spPr>
@@ -21025,7 +21227,7 @@
             <a:effectLst/>
             <a:extLst>
               <a:ext uri="{C572A759-6A51-4108-AA02-DFA0A04FC94B}">
-                <ma14:wrappingTextBoxFlag xmlns:ma14="http://schemas.microsoft.com/office/mac/drawingml/2011/main" xmlns:a14="http://schemas.microsoft.com/office/drawing/2010/main" xmlns:m="http://schemas.openxmlformats.org/officeDocument/2006/math" xmlns="" val="1"/>
+                <ma14:wrappingTextBoxFlag xmlns="" xmlns:m="http://schemas.openxmlformats.org/officeDocument/2006/math" xmlns:a14="http://schemas.microsoft.com/office/drawing/2010/main" xmlns:ma14="http://schemas.microsoft.com/office/mac/drawingml/2011/main" val="1"/>
               </a:ext>
             </a:extLst>
           </p:spPr>
@@ -22615,7 +22817,7 @@
             <a:effectLst/>
             <a:extLst>
               <a:ext uri="{C572A759-6A51-4108-AA02-DFA0A04FC94B}">
-                <ma14:wrappingTextBoxFlag xmlns="" xmlns:m="http://schemas.openxmlformats.org/officeDocument/2006/math" xmlns:a14="http://schemas.microsoft.com/office/drawing/2010/main" xmlns:ma14="http://schemas.microsoft.com/office/mac/drawingml/2011/main" val="1"/>
+                <ma14:wrappingTextBoxFlag xmlns:ma14="http://schemas.microsoft.com/office/mac/drawingml/2011/main" xmlns:a14="http://schemas.microsoft.com/office/drawing/2010/main" xmlns:m="http://schemas.openxmlformats.org/officeDocument/2006/math" xmlns="" val="1"/>
               </a:ext>
             </a:extLst>
           </p:spPr>
@@ -26931,7 +27133,7 @@
             <a:effectLst/>
             <a:extLst>
               <a:ext uri="{C572A759-6A51-4108-AA02-DFA0A04FC94B}">
-                <ma14:wrappingTextBoxFlag xmlns="" xmlns:m="http://schemas.openxmlformats.org/officeDocument/2006/math" xmlns:a14="http://schemas.microsoft.com/office/drawing/2010/main" xmlns:ma14="http://schemas.microsoft.com/office/mac/drawingml/2011/main" val="1"/>
+                <ma14:wrappingTextBoxFlag xmlns:ma14="http://schemas.microsoft.com/office/mac/drawingml/2011/main" xmlns:a14="http://schemas.microsoft.com/office/drawing/2010/main" xmlns:m="http://schemas.openxmlformats.org/officeDocument/2006/math" xmlns="" val="1"/>
               </a:ext>
             </a:extLst>
           </p:spPr>
@@ -27234,7 +27436,7 @@
           </a:prstGeom>
           <a:extLst>
             <a:ext uri="{C572A759-6A51-4108-AA02-DFA0A04FC94B}">
-              <ma14:wrappingTextBoxFlag xmlns="" xmlns:m="http://schemas.openxmlformats.org/officeDocument/2006/math" xmlns:a14="http://schemas.microsoft.com/office/drawing/2010/main" xmlns:ma14="http://schemas.microsoft.com/office/mac/drawingml/2011/main" val="1"/>
+              <ma14:wrappingTextBoxFlag xmlns:ma14="http://schemas.microsoft.com/office/mac/drawingml/2011/main" xmlns:a14="http://schemas.microsoft.com/office/drawing/2010/main" xmlns:m="http://schemas.openxmlformats.org/officeDocument/2006/math" xmlns="" val="1"/>
             </a:ext>
           </a:extLst>
         </p:spPr>
@@ -27272,7 +27474,7 @@
           </a:ln>
           <a:extLst>
             <a:ext uri="{C572A759-6A51-4108-AA02-DFA0A04FC94B}">
-              <ma14:wrappingTextBoxFlag xmlns="" xmlns:m="http://schemas.openxmlformats.org/officeDocument/2006/math" xmlns:a14="http://schemas.microsoft.com/office/drawing/2010/main" xmlns:ma14="http://schemas.microsoft.com/office/mac/drawingml/2011/main" val="1"/>
+              <ma14:wrappingTextBoxFlag xmlns:ma14="http://schemas.microsoft.com/office/mac/drawingml/2011/main" xmlns:a14="http://schemas.microsoft.com/office/drawing/2010/main" xmlns:m="http://schemas.openxmlformats.org/officeDocument/2006/math" xmlns="" val="1"/>
             </a:ext>
           </a:extLst>
         </p:spPr>
@@ -28339,7 +28541,7 @@
           </a:ln>
           <a:extLst>
             <a:ext uri="{C572A759-6A51-4108-AA02-DFA0A04FC94B}">
-              <ma14:wrappingTextBoxFlag xmlns="" xmlns:m="http://schemas.openxmlformats.org/officeDocument/2006/math" xmlns:a14="http://schemas.microsoft.com/office/drawing/2010/main" xmlns:ma14="http://schemas.microsoft.com/office/mac/drawingml/2011/main" val="1"/>
+              <ma14:wrappingTextBoxFlag xmlns:ma14="http://schemas.microsoft.com/office/mac/drawingml/2011/main" xmlns:a14="http://schemas.microsoft.com/office/drawing/2010/main" xmlns:m="http://schemas.openxmlformats.org/officeDocument/2006/math" xmlns="" val="1"/>
             </a:ext>
           </a:extLst>
         </p:spPr>
@@ -29371,7 +29573,7 @@
           </a:ln>
           <a:extLst>
             <a:ext uri="{C572A759-6A51-4108-AA02-DFA0A04FC94B}">
-              <ma14:wrappingTextBoxFlag xmlns="" xmlns:m="http://schemas.openxmlformats.org/officeDocument/2006/math" xmlns:a14="http://schemas.microsoft.com/office/drawing/2010/main" xmlns:ma14="http://schemas.microsoft.com/office/mac/drawingml/2011/main" val="1"/>
+              <ma14:wrappingTextBoxFlag xmlns:ma14="http://schemas.microsoft.com/office/mac/drawingml/2011/main" xmlns:a14="http://schemas.microsoft.com/office/drawing/2010/main" xmlns:m="http://schemas.openxmlformats.org/officeDocument/2006/math" xmlns="" val="1"/>
             </a:ext>
           </a:extLst>
         </p:spPr>
@@ -29429,7 +29631,7 @@
           </a:ln>
           <a:extLst>
             <a:ext uri="{C572A759-6A51-4108-AA02-DFA0A04FC94B}">
-              <ma14:wrappingTextBoxFlag xmlns="" xmlns:m="http://schemas.openxmlformats.org/officeDocument/2006/math" xmlns:a14="http://schemas.microsoft.com/office/drawing/2010/main" xmlns:ma14="http://schemas.microsoft.com/office/mac/drawingml/2011/main" val="1"/>
+              <ma14:wrappingTextBoxFlag xmlns:ma14="http://schemas.microsoft.com/office/mac/drawingml/2011/main" xmlns:a14="http://schemas.microsoft.com/office/drawing/2010/main" xmlns:m="http://schemas.openxmlformats.org/officeDocument/2006/math" xmlns="" val="1"/>
             </a:ext>
           </a:extLst>
         </p:spPr>
@@ -29473,7 +29675,7 @@
           </a:ln>
           <a:extLst>
             <a:ext uri="{C572A759-6A51-4108-AA02-DFA0A04FC94B}">
-              <ma14:wrappingTextBoxFlag xmlns="" xmlns:m="http://schemas.openxmlformats.org/officeDocument/2006/math" xmlns:a14="http://schemas.microsoft.com/office/drawing/2010/main" xmlns:ma14="http://schemas.microsoft.com/office/mac/drawingml/2011/main" val="1"/>
+              <ma14:wrappingTextBoxFlag xmlns:ma14="http://schemas.microsoft.com/office/mac/drawingml/2011/main" xmlns:a14="http://schemas.microsoft.com/office/drawing/2010/main" xmlns:m="http://schemas.openxmlformats.org/officeDocument/2006/math" xmlns="" val="1"/>
             </a:ext>
           </a:extLst>
         </p:spPr>
@@ -29509,7 +29711,7 @@
           </a:ln>
           <a:extLst>
             <a:ext uri="{C572A759-6A51-4108-AA02-DFA0A04FC94B}">
-              <ma14:wrappingTextBoxFlag xmlns="" xmlns:m="http://schemas.openxmlformats.org/officeDocument/2006/math" xmlns:a14="http://schemas.microsoft.com/office/drawing/2010/main" xmlns:ma14="http://schemas.microsoft.com/office/mac/drawingml/2011/main" val="1"/>
+              <ma14:wrappingTextBoxFlag xmlns:ma14="http://schemas.microsoft.com/office/mac/drawingml/2011/main" xmlns:a14="http://schemas.microsoft.com/office/drawing/2010/main" xmlns:m="http://schemas.openxmlformats.org/officeDocument/2006/math" xmlns="" val="1"/>
             </a:ext>
           </a:extLst>
         </p:spPr>
@@ -29597,7 +29799,7 @@
             <a:effectLst/>
             <a:extLst>
               <a:ext uri="{C572A759-6A51-4108-AA02-DFA0A04FC94B}">
-                <ma14:wrappingTextBoxFlag xmlns="" xmlns:m="http://schemas.openxmlformats.org/officeDocument/2006/math" xmlns:a14="http://schemas.microsoft.com/office/drawing/2010/main" xmlns:ma14="http://schemas.microsoft.com/office/mac/drawingml/2011/main" val="1"/>
+                <ma14:wrappingTextBoxFlag xmlns:ma14="http://schemas.microsoft.com/office/mac/drawingml/2011/main" xmlns:a14="http://schemas.microsoft.com/office/drawing/2010/main" xmlns:m="http://schemas.openxmlformats.org/officeDocument/2006/math" xmlns="" val="1"/>
               </a:ext>
             </a:extLst>
           </p:spPr>
@@ -29859,7 +30061,7 @@
             <a:effectLst/>
             <a:extLst>
               <a:ext uri="{C572A759-6A51-4108-AA02-DFA0A04FC94B}">
-                <ma14:wrappingTextBoxFlag xmlns="" xmlns:m="http://schemas.openxmlformats.org/officeDocument/2006/math" xmlns:a14="http://schemas.microsoft.com/office/drawing/2010/main" xmlns:ma14="http://schemas.microsoft.com/office/mac/drawingml/2011/main" val="1"/>
+                <ma14:wrappingTextBoxFlag xmlns:ma14="http://schemas.microsoft.com/office/mac/drawingml/2011/main" xmlns:a14="http://schemas.microsoft.com/office/drawing/2010/main" xmlns:m="http://schemas.openxmlformats.org/officeDocument/2006/math" xmlns="" val="1"/>
               </a:ext>
             </a:extLst>
           </p:spPr>
@@ -31843,7 +32045,7 @@
           </a:prstGeom>
           <a:extLst>
             <a:ext uri="{C572A759-6A51-4108-AA02-DFA0A04FC94B}">
-              <ma14:wrappingTextBoxFlag xmlns="" xmlns:m="http://schemas.openxmlformats.org/officeDocument/2006/math" xmlns:a14="http://schemas.microsoft.com/office/drawing/2010/main" xmlns:ma14="http://schemas.microsoft.com/office/mac/drawingml/2011/main" val="1"/>
+              <ma14:wrappingTextBoxFlag xmlns:ma14="http://schemas.microsoft.com/office/mac/drawingml/2011/main" xmlns:a14="http://schemas.microsoft.com/office/drawing/2010/main" xmlns:m="http://schemas.openxmlformats.org/officeDocument/2006/math" xmlns="" val="1"/>
             </a:ext>
           </a:extLst>
         </p:spPr>
@@ -32233,7 +32435,7 @@
               </a:effectLst>
               <a:extLst>
                 <a:ext uri="{C572A759-6A51-4108-AA02-DFA0A04FC94B}">
-                  <ma14:wrappingTextBoxFlag xmlns="" xmlns:m="http://schemas.openxmlformats.org/officeDocument/2006/math" xmlns:a14="http://schemas.microsoft.com/office/drawing/2010/main" xmlns:ma14="http://schemas.microsoft.com/office/mac/drawingml/2011/main" val="1"/>
+                  <ma14:wrappingTextBoxFlag xmlns:ma14="http://schemas.microsoft.com/office/mac/drawingml/2011/main" xmlns:a14="http://schemas.microsoft.com/office/drawing/2010/main" xmlns:m="http://schemas.openxmlformats.org/officeDocument/2006/math" xmlns="" val="1"/>
                 </a:ext>
               </a:extLst>
             </p:spPr>
@@ -32303,7 +32505,7 @@
               </a:effectLst>
               <a:extLst>
                 <a:ext uri="{C572A759-6A51-4108-AA02-DFA0A04FC94B}">
-                  <ma14:wrappingTextBoxFlag xmlns="" xmlns:m="http://schemas.openxmlformats.org/officeDocument/2006/math" xmlns:a14="http://schemas.microsoft.com/office/drawing/2010/main" xmlns:ma14="http://schemas.microsoft.com/office/mac/drawingml/2011/main" val="1"/>
+                  <ma14:wrappingTextBoxFlag xmlns:ma14="http://schemas.microsoft.com/office/mac/drawingml/2011/main" xmlns:a14="http://schemas.microsoft.com/office/drawing/2010/main" xmlns:m="http://schemas.openxmlformats.org/officeDocument/2006/math" xmlns="" val="1"/>
                 </a:ext>
               </a:extLst>
             </p:spPr>
@@ -32371,7 +32573,7 @@
               </a:effectLst>
               <a:extLst>
                 <a:ext uri="{C572A759-6A51-4108-AA02-DFA0A04FC94B}">
-                  <ma14:wrappingTextBoxFlag xmlns="" xmlns:m="http://schemas.openxmlformats.org/officeDocument/2006/math" xmlns:a14="http://schemas.microsoft.com/office/drawing/2010/main" xmlns:ma14="http://schemas.microsoft.com/office/mac/drawingml/2011/main" val="1"/>
+                  <ma14:wrappingTextBoxFlag xmlns:ma14="http://schemas.microsoft.com/office/mac/drawingml/2011/main" xmlns:a14="http://schemas.microsoft.com/office/drawing/2010/main" xmlns:m="http://schemas.openxmlformats.org/officeDocument/2006/math" xmlns="" val="1"/>
                 </a:ext>
               </a:extLst>
             </p:spPr>
@@ -32459,7 +32661,7 @@
                 </a:effectLst>
                 <a:extLst>
                   <a:ext uri="{C572A759-6A51-4108-AA02-DFA0A04FC94B}">
-                    <ma14:wrappingTextBoxFlag xmlns="" xmlns:m="http://schemas.openxmlformats.org/officeDocument/2006/math" xmlns:a14="http://schemas.microsoft.com/office/drawing/2010/main" xmlns:ma14="http://schemas.microsoft.com/office/mac/drawingml/2011/main" val="1"/>
+                    <ma14:wrappingTextBoxFlag xmlns:ma14="http://schemas.microsoft.com/office/mac/drawingml/2011/main" xmlns:a14="http://schemas.microsoft.com/office/drawing/2010/main" xmlns:m="http://schemas.openxmlformats.org/officeDocument/2006/math" xmlns="" val="1"/>
                   </a:ext>
                 </a:extLst>
               </p:spPr>
@@ -32637,7 +32839,7 @@
                   <a:effectLst/>
                   <a:extLst>
                     <a:ext uri="{C572A759-6A51-4108-AA02-DFA0A04FC94B}">
-                      <ma14:wrappingTextBoxFlag xmlns="" xmlns:m="http://schemas.openxmlformats.org/officeDocument/2006/math" xmlns:a14="http://schemas.microsoft.com/office/drawing/2010/main" xmlns:ma14="http://schemas.microsoft.com/office/mac/drawingml/2011/main" val="1"/>
+                      <ma14:wrappingTextBoxFlag xmlns:ma14="http://schemas.microsoft.com/office/mac/drawingml/2011/main" xmlns:a14="http://schemas.microsoft.com/office/drawing/2010/main" xmlns:m="http://schemas.openxmlformats.org/officeDocument/2006/math" xmlns="" val="1"/>
                     </a:ext>
                   </a:extLst>
                 </p:spPr>
@@ -32837,7 +33039,7 @@
                   <a:effectLst/>
                   <a:extLst>
                     <a:ext uri="{C572A759-6A51-4108-AA02-DFA0A04FC94B}">
-                      <ma14:wrappingTextBoxFlag xmlns="" xmlns:m="http://schemas.openxmlformats.org/officeDocument/2006/math" xmlns:a14="http://schemas.microsoft.com/office/drawing/2010/main" xmlns:ma14="http://schemas.microsoft.com/office/mac/drawingml/2011/main" val="1"/>
+                      <ma14:wrappingTextBoxFlag xmlns:ma14="http://schemas.microsoft.com/office/mac/drawingml/2011/main" xmlns:a14="http://schemas.microsoft.com/office/drawing/2010/main" xmlns:m="http://schemas.openxmlformats.org/officeDocument/2006/math" xmlns="" val="1"/>
                     </a:ext>
                   </a:extLst>
                 </p:spPr>
@@ -32927,7 +33129,7 @@
                 </a:effectLst>
                 <a:extLst>
                   <a:ext uri="{C572A759-6A51-4108-AA02-DFA0A04FC94B}">
-                    <ma14:wrappingTextBoxFlag xmlns="" xmlns:m="http://schemas.openxmlformats.org/officeDocument/2006/math" xmlns:a14="http://schemas.microsoft.com/office/drawing/2010/main" xmlns:ma14="http://schemas.microsoft.com/office/mac/drawingml/2011/main" val="1"/>
+                    <ma14:wrappingTextBoxFlag xmlns:ma14="http://schemas.microsoft.com/office/mac/drawingml/2011/main" xmlns:a14="http://schemas.microsoft.com/office/drawing/2010/main" xmlns:m="http://schemas.openxmlformats.org/officeDocument/2006/math" xmlns="" val="1"/>
                   </a:ext>
                 </a:extLst>
               </p:spPr>
@@ -33105,7 +33307,7 @@
                   <a:effectLst/>
                   <a:extLst>
                     <a:ext uri="{C572A759-6A51-4108-AA02-DFA0A04FC94B}">
-                      <ma14:wrappingTextBoxFlag xmlns="" xmlns:m="http://schemas.openxmlformats.org/officeDocument/2006/math" xmlns:a14="http://schemas.microsoft.com/office/drawing/2010/main" xmlns:ma14="http://schemas.microsoft.com/office/mac/drawingml/2011/main" val="1"/>
+                      <ma14:wrappingTextBoxFlag xmlns:ma14="http://schemas.microsoft.com/office/mac/drawingml/2011/main" xmlns:a14="http://schemas.microsoft.com/office/drawing/2010/main" xmlns:m="http://schemas.openxmlformats.org/officeDocument/2006/math" xmlns="" val="1"/>
                     </a:ext>
                   </a:extLst>
                 </p:spPr>
@@ -33195,7 +33397,7 @@
                 </a:effectLst>
                 <a:extLst>
                   <a:ext uri="{C572A759-6A51-4108-AA02-DFA0A04FC94B}">
-                    <ma14:wrappingTextBoxFlag xmlns="" xmlns:m="http://schemas.openxmlformats.org/officeDocument/2006/math" xmlns:a14="http://schemas.microsoft.com/office/drawing/2010/main" xmlns:ma14="http://schemas.microsoft.com/office/mac/drawingml/2011/main" val="1"/>
+                    <ma14:wrappingTextBoxFlag xmlns:ma14="http://schemas.microsoft.com/office/mac/drawingml/2011/main" xmlns:a14="http://schemas.microsoft.com/office/drawing/2010/main" xmlns:m="http://schemas.openxmlformats.org/officeDocument/2006/math" xmlns="" val="1"/>
                   </a:ext>
                 </a:extLst>
               </p:spPr>
@@ -33373,7 +33575,7 @@
                   <a:effectLst/>
                   <a:extLst>
                     <a:ext uri="{C572A759-6A51-4108-AA02-DFA0A04FC94B}">
-                      <ma14:wrappingTextBoxFlag xmlns="" xmlns:m="http://schemas.openxmlformats.org/officeDocument/2006/math" xmlns:a14="http://schemas.microsoft.com/office/drawing/2010/main" xmlns:ma14="http://schemas.microsoft.com/office/mac/drawingml/2011/main" val="1"/>
+                      <ma14:wrappingTextBoxFlag xmlns:ma14="http://schemas.microsoft.com/office/mac/drawingml/2011/main" xmlns:a14="http://schemas.microsoft.com/office/drawing/2010/main" xmlns:m="http://schemas.openxmlformats.org/officeDocument/2006/math" xmlns="" val="1"/>
                     </a:ext>
                   </a:extLst>
                 </p:spPr>
@@ -33444,7 +33646,7 @@
             </a:effectLst>
             <a:extLst>
               <a:ext uri="{C572A759-6A51-4108-AA02-DFA0A04FC94B}">
-                <ma14:wrappingTextBoxFlag xmlns="" xmlns:m="http://schemas.openxmlformats.org/officeDocument/2006/math" xmlns:a14="http://schemas.microsoft.com/office/drawing/2010/main" xmlns:ma14="http://schemas.microsoft.com/office/mac/drawingml/2011/main" val="1"/>
+                <ma14:wrappingTextBoxFlag xmlns:ma14="http://schemas.microsoft.com/office/mac/drawingml/2011/main" xmlns:a14="http://schemas.microsoft.com/office/drawing/2010/main" xmlns:m="http://schemas.openxmlformats.org/officeDocument/2006/math" xmlns="" val="1"/>
               </a:ext>
             </a:extLst>
           </p:spPr>
@@ -33671,7 +33873,7 @@
           </a:prstGeom>
           <a:extLst>
             <a:ext uri="{C572A759-6A51-4108-AA02-DFA0A04FC94B}">
-              <ma14:wrappingTextBoxFlag xmlns="" xmlns:m="http://schemas.openxmlformats.org/officeDocument/2006/math" xmlns:a14="http://schemas.microsoft.com/office/drawing/2010/main" xmlns:ma14="http://schemas.microsoft.com/office/mac/drawingml/2011/main" val="1"/>
+              <ma14:wrappingTextBoxFlag xmlns:ma14="http://schemas.microsoft.com/office/mac/drawingml/2011/main" xmlns:a14="http://schemas.microsoft.com/office/drawing/2010/main" xmlns:m="http://schemas.openxmlformats.org/officeDocument/2006/math" xmlns="" val="1"/>
             </a:ext>
           </a:extLst>
         </p:spPr>
@@ -34609,7 +34811,7 @@
           </a:ln>
           <a:extLst>
             <a:ext uri="{C572A759-6A51-4108-AA02-DFA0A04FC94B}">
-              <ma14:wrappingTextBoxFlag xmlns:ma14="http://schemas.microsoft.com/office/mac/drawingml/2011/main" xmlns:a14="http://schemas.microsoft.com/office/drawing/2010/main" xmlns:m="http://schemas.openxmlformats.org/officeDocument/2006/math" xmlns="" val="1"/>
+              <ma14:wrappingTextBoxFlag xmlns="" xmlns:m="http://schemas.openxmlformats.org/officeDocument/2006/math" xmlns:a14="http://schemas.microsoft.com/office/drawing/2010/main" xmlns:ma14="http://schemas.microsoft.com/office/mac/drawingml/2011/main" val="1"/>
             </a:ext>
           </a:extLst>
         </p:spPr>
@@ -36670,7 +36872,7 @@
           </a:ln>
           <a:extLst>
             <a:ext uri="{C572A759-6A51-4108-AA02-DFA0A04FC94B}">
-              <ma14:wrappingTextBoxFlag xmlns="" xmlns:m="http://schemas.openxmlformats.org/officeDocument/2006/math" xmlns:a14="http://schemas.microsoft.com/office/drawing/2010/main" xmlns:ma14="http://schemas.microsoft.com/office/mac/drawingml/2011/main" val="1"/>
+              <ma14:wrappingTextBoxFlag xmlns:ma14="http://schemas.microsoft.com/office/mac/drawingml/2011/main" xmlns:a14="http://schemas.microsoft.com/office/drawing/2010/main" xmlns:m="http://schemas.openxmlformats.org/officeDocument/2006/math" xmlns="" val="1"/>
             </a:ext>
           </a:extLst>
         </p:spPr>
@@ -37452,7 +37654,7 @@
           </a:ln>
           <a:extLst>
             <a:ext uri="{C572A759-6A51-4108-AA02-DFA0A04FC94B}">
-              <ma14:wrappingTextBoxFlag xmlns="" xmlns:m="http://schemas.openxmlformats.org/officeDocument/2006/math" xmlns:a14="http://schemas.microsoft.com/office/drawing/2010/main" xmlns:ma14="http://schemas.microsoft.com/office/mac/drawingml/2011/main" val="1"/>
+              <ma14:wrappingTextBoxFlag xmlns:ma14="http://schemas.microsoft.com/office/mac/drawingml/2011/main" xmlns:a14="http://schemas.microsoft.com/office/drawing/2010/main" xmlns:m="http://schemas.openxmlformats.org/officeDocument/2006/math" xmlns="" val="1"/>
             </a:ext>
           </a:extLst>
         </p:spPr>
@@ -40115,6 +40317,389 @@
           <p:cNvPr id="2" name="Title 1">
             <a:extLst>
               <a:ext uri="{FF2B5EF4-FFF2-40B4-BE49-F238E27FC236}">
+                <a16:creationId xmlns:a16="http://schemas.microsoft.com/office/drawing/2014/main" id="{4AB7B9C2-5D09-C319-491E-9E97079CFA3D}"/>
+              </a:ext>
+            </a:extLst>
+          </p:cNvPr>
+          <p:cNvSpPr>
+            <a:spLocks noGrp="1"/>
+          </p:cNvSpPr>
+          <p:nvPr>
+            <p:ph type="title"/>
+          </p:nvPr>
+        </p:nvSpPr>
+        <p:spPr/>
+        <p:txBody>
+          <a:bodyPr/>
+          <a:lstStyle/>
+          <a:p>
+            <a:r>
+              <a:rPr lang="en-US"/>
+              <a:t>The Self-Ticking </a:t>
+            </a:r>
+            <a:r>
+              <a:rPr lang="en-US" dirty="0"/>
+              <a:t>Clock</a:t>
+            </a:r>
+          </a:p>
+        </p:txBody>
+      </p:sp>
+      <p:sp>
+        <p:nvSpPr>
+          <p:cNvPr id="3" name="Content Placeholder 2">
+            <a:extLst>
+              <a:ext uri="{FF2B5EF4-FFF2-40B4-BE49-F238E27FC236}">
+                <a16:creationId xmlns:a16="http://schemas.microsoft.com/office/drawing/2014/main" id="{E95A29C5-3A07-008B-EE77-48C8F818925D}"/>
+              </a:ext>
+            </a:extLst>
+          </p:cNvPr>
+          <p:cNvSpPr>
+            <a:spLocks noGrp="1"/>
+          </p:cNvSpPr>
+          <p:nvPr>
+            <p:ph idx="1"/>
+          </p:nvPr>
+        </p:nvSpPr>
+        <p:spPr/>
+        <p:txBody>
+          <a:bodyPr/>
+          <a:lstStyle/>
+          <a:p>
+            <a:r>
+              <a:rPr lang="en-US" dirty="0"/>
+              <a:t>To make the clock self-ticking, add the following line to your clock:</a:t>
+            </a:r>
+          </a:p>
+        </p:txBody>
+      </p:sp>
+      <p:sp>
+        <p:nvSpPr>
+          <p:cNvPr id="4" name="Slide Number Placeholder 3">
+            <a:extLst>
+              <a:ext uri="{FF2B5EF4-FFF2-40B4-BE49-F238E27FC236}">
+                <a16:creationId xmlns:a16="http://schemas.microsoft.com/office/drawing/2014/main" id="{FD5514DD-8CC2-2079-25D3-051BCF7BECA6}"/>
+              </a:ext>
+            </a:extLst>
+          </p:cNvPr>
+          <p:cNvSpPr>
+            <a:spLocks noGrp="1"/>
+          </p:cNvSpPr>
+          <p:nvPr>
+            <p:ph type="sldNum" sz="quarter" idx="12"/>
+          </p:nvPr>
+        </p:nvSpPr>
+        <p:spPr/>
+        <p:txBody>
+          <a:bodyPr/>
+          <a:lstStyle/>
+          <a:p>
+            <a:pPr marL="0" marR="0" lvl="0" indent="0" algn="r" defTabSz="914400" rtl="0" eaLnBrk="1" fontAlgn="auto" latinLnBrk="0" hangingPunct="1">
+              <a:lnSpc>
+                <a:spcPct val="100000"/>
+              </a:lnSpc>
+              <a:spcBef>
+                <a:spcPts val="0"/>
+              </a:spcBef>
+              <a:spcAft>
+                <a:spcPts val="0"/>
+              </a:spcAft>
+              <a:buClrTx/>
+              <a:buSzTx/>
+              <a:buFontTx/>
+              <a:buNone/>
+              <a:tabLst/>
+              <a:defRPr/>
+            </a:pPr>
+            <a:fld id="{20F37917-FD3A-4669-9018-DA04BCDD3D75}" type="slidenum">
+              <a:rPr kumimoji="0" lang="en-US" sz="1200" b="0" i="0" u="none" strike="noStrike" kern="1200" cap="none" spc="0" normalizeH="0" baseline="0" noProof="0" smtClean="0">
+                <a:ln>
+                  <a:noFill/>
+                </a:ln>
+                <a:solidFill>
+                  <a:prstClr val="black">
+                    <a:tint val="75000"/>
+                  </a:prstClr>
+                </a:solidFill>
+                <a:effectLst/>
+                <a:uLnTx/>
+                <a:uFillTx/>
+                <a:latin typeface="Calibri" panose="020F0502020204030204"/>
+                <a:ea typeface="+mn-ea"/>
+                <a:cs typeface="+mn-cs"/>
+              </a:rPr>
+              <a:pPr marL="0" marR="0" lvl="0" indent="0" algn="r" defTabSz="914400" rtl="0" eaLnBrk="1" fontAlgn="auto" latinLnBrk="0" hangingPunct="1">
+                <a:lnSpc>
+                  <a:spcPct val="100000"/>
+                </a:lnSpc>
+                <a:spcBef>
+                  <a:spcPts val="0"/>
+                </a:spcBef>
+                <a:spcAft>
+                  <a:spcPts val="0"/>
+                </a:spcAft>
+                <a:buClrTx/>
+                <a:buSzTx/>
+                <a:buFontTx/>
+                <a:buNone/>
+                <a:tabLst/>
+                <a:defRPr/>
+              </a:pPr>
+              <a:t>38</a:t>
+            </a:fld>
+            <a:endParaRPr kumimoji="0" lang="en-US" sz="1200" b="0" i="0" u="none" strike="noStrike" kern="1200" cap="none" spc="0" normalizeH="0" baseline="0" noProof="0">
+              <a:ln>
+                <a:noFill/>
+              </a:ln>
+              <a:solidFill>
+                <a:prstClr val="black">
+                  <a:tint val="75000"/>
+                </a:prstClr>
+              </a:solidFill>
+              <a:effectLst/>
+              <a:uLnTx/>
+              <a:uFillTx/>
+              <a:latin typeface="Calibri" panose="020F0502020204030204"/>
+              <a:ea typeface="+mn-ea"/>
+              <a:cs typeface="+mn-cs"/>
+            </a:endParaRPr>
+          </a:p>
+        </p:txBody>
+      </p:sp>
+      <p:sp>
+        <p:nvSpPr>
+          <p:cNvPr id="6" name="TextBox 5">
+            <a:extLst>
+              <a:ext uri="{FF2B5EF4-FFF2-40B4-BE49-F238E27FC236}">
+                <a16:creationId xmlns:a16="http://schemas.microsoft.com/office/drawing/2014/main" id="{D7EEA937-36F0-3A62-61A1-D81A0C7A205D}"/>
+              </a:ext>
+            </a:extLst>
+          </p:cNvPr>
+          <p:cNvSpPr txBox="1"/>
+          <p:nvPr/>
+        </p:nvSpPr>
+        <p:spPr>
+          <a:xfrm>
+            <a:off x="1219200" y="2880588"/>
+            <a:ext cx="9051636" cy="1200329"/>
+          </a:xfrm>
+          <a:prstGeom prst="rect">
+            <a:avLst/>
+          </a:prstGeom>
+          <a:noFill/>
+          <a:ln w="12700" cap="flat" cmpd="sng" algn="ctr">
+            <a:noFill/>
+            <a:prstDash val="solid"/>
+            <a:miter lim="800000"/>
+          </a:ln>
+          <a:effectLst/>
+        </p:spPr>
+        <p:style>
+          <a:lnRef idx="2">
+            <a:schemeClr val="accent1">
+              <a:shade val="50000"/>
+            </a:schemeClr>
+          </a:lnRef>
+          <a:fillRef idx="1">
+            <a:schemeClr val="accent1"/>
+          </a:fillRef>
+          <a:effectRef idx="0">
+            <a:schemeClr val="accent1"/>
+          </a:effectRef>
+          <a:fontRef idx="minor">
+            <a:schemeClr val="lt1"/>
+          </a:fontRef>
+        </p:style>
+        <p:txBody>
+          <a:bodyPr wrap="square">
+            <a:spAutoFit/>
+          </a:bodyPr>
+          <a:lstStyle/>
+          <a:p>
+            <a:pPr algn="l"/>
+            <a:r>
+              <a:rPr lang="en-US" sz="2400" b="0" dirty="0">
+                <a:solidFill>
+                  <a:srgbClr val="0000FF"/>
+                </a:solidFill>
+                <a:effectLst/>
+                <a:latin typeface="Consolas" panose="020B0609020204030204" pitchFamily="49" charset="0"/>
+              </a:rPr>
+              <a:t>constructor</a:t>
+            </a:r>
+            <a:r>
+              <a:rPr lang="en-US" sz="2400" b="0" dirty="0">
+                <a:solidFill>
+                  <a:srgbClr val="000000"/>
+                </a:solidFill>
+                <a:effectLst/>
+                <a:latin typeface="Consolas" panose="020B0609020204030204" pitchFamily="49" charset="0"/>
+              </a:rPr>
+              <a:t> () {</a:t>
+            </a:r>
+          </a:p>
+          <a:p>
+            <a:pPr algn="l"/>
+            <a:r>
+              <a:rPr lang="en-US" sz="2400" b="0" dirty="0">
+                <a:solidFill>
+                  <a:srgbClr val="000000"/>
+                </a:solidFill>
+                <a:effectLst/>
+                <a:latin typeface="Consolas" panose="020B0609020204030204" pitchFamily="49" charset="0"/>
+              </a:rPr>
+              <a:t>  </a:t>
+            </a:r>
+            <a:r>
+              <a:rPr lang="en-US" sz="2400" b="0" dirty="0" err="1">
+                <a:solidFill>
+                  <a:srgbClr val="795E26"/>
+                </a:solidFill>
+                <a:effectLst/>
+                <a:latin typeface="Consolas" panose="020B0609020204030204" pitchFamily="49" charset="0"/>
+              </a:rPr>
+              <a:t>setInterval</a:t>
+            </a:r>
+            <a:r>
+              <a:rPr lang="en-US" sz="2400" b="0" dirty="0">
+                <a:solidFill>
+                  <a:srgbClr val="000000"/>
+                </a:solidFill>
+                <a:effectLst/>
+                <a:latin typeface="Consolas" panose="020B0609020204030204" pitchFamily="49" charset="0"/>
+              </a:rPr>
+              <a:t>(() </a:t>
+            </a:r>
+            <a:r>
+              <a:rPr lang="en-US" sz="2400" b="0" dirty="0">
+                <a:solidFill>
+                  <a:srgbClr val="0000FF"/>
+                </a:solidFill>
+                <a:effectLst/>
+                <a:latin typeface="Consolas" panose="020B0609020204030204" pitchFamily="49" charset="0"/>
+              </a:rPr>
+              <a:t>=&gt;</a:t>
+            </a:r>
+            <a:r>
+              <a:rPr lang="en-US" sz="2400" b="0" dirty="0">
+                <a:solidFill>
+                  <a:srgbClr val="000000"/>
+                </a:solidFill>
+                <a:effectLst/>
+                <a:latin typeface="Consolas" panose="020B0609020204030204" pitchFamily="49" charset="0"/>
+              </a:rPr>
+              <a:t>{</a:t>
+            </a:r>
+            <a:r>
+              <a:rPr lang="en-US" sz="2400" b="0" dirty="0" err="1">
+                <a:solidFill>
+                  <a:srgbClr val="0000FF"/>
+                </a:solidFill>
+                <a:effectLst/>
+                <a:latin typeface="Consolas" panose="020B0609020204030204" pitchFamily="49" charset="0"/>
+              </a:rPr>
+              <a:t>this</a:t>
+            </a:r>
+            <a:r>
+              <a:rPr lang="en-US" sz="2400" b="0" dirty="0" err="1">
+                <a:solidFill>
+                  <a:srgbClr val="000000"/>
+                </a:solidFill>
+                <a:effectLst/>
+                <a:latin typeface="Consolas" panose="020B0609020204030204" pitchFamily="49" charset="0"/>
+              </a:rPr>
+              <a:t>.</a:t>
+            </a:r>
+            <a:r>
+              <a:rPr lang="en-US" sz="2400" b="0" dirty="0" err="1">
+                <a:solidFill>
+                  <a:srgbClr val="795E26"/>
+                </a:solidFill>
+                <a:effectLst/>
+                <a:latin typeface="Consolas" panose="020B0609020204030204" pitchFamily="49" charset="0"/>
+              </a:rPr>
+              <a:t>tick</a:t>
+            </a:r>
+            <a:r>
+              <a:rPr lang="en-US" sz="2400" b="0" dirty="0">
+                <a:solidFill>
+                  <a:srgbClr val="000000"/>
+                </a:solidFill>
+                <a:effectLst/>
+                <a:latin typeface="Consolas" panose="020B0609020204030204" pitchFamily="49" charset="0"/>
+              </a:rPr>
+              <a:t>()},</a:t>
+            </a:r>
+            <a:r>
+              <a:rPr lang="en-US" sz="2400" b="0" dirty="0">
+                <a:solidFill>
+                  <a:srgbClr val="098658"/>
+                </a:solidFill>
+                <a:effectLst/>
+                <a:latin typeface="Consolas" panose="020B0609020204030204" pitchFamily="49" charset="0"/>
+              </a:rPr>
+              <a:t>50</a:t>
+            </a:r>
+            <a:r>
+              <a:rPr lang="en-US" sz="2400" b="0" dirty="0">
+                <a:solidFill>
+                  <a:srgbClr val="000000"/>
+                </a:solidFill>
+                <a:effectLst/>
+                <a:latin typeface="Consolas" panose="020B0609020204030204" pitchFamily="49" charset="0"/>
+              </a:rPr>
+              <a:t>)          </a:t>
+            </a:r>
+          </a:p>
+          <a:p>
+            <a:pPr algn="l"/>
+            <a:r>
+              <a:rPr lang="en-US" sz="2400" b="0" dirty="0">
+                <a:solidFill>
+                  <a:srgbClr val="000000"/>
+                </a:solidFill>
+                <a:effectLst/>
+                <a:latin typeface="Consolas" panose="020B0609020204030204" pitchFamily="49" charset="0"/>
+              </a:rPr>
+              <a:t>}</a:t>
+            </a:r>
+          </a:p>
+        </p:txBody>
+      </p:sp>
+    </p:spTree>
+    <p:extLst>
+      <p:ext uri="{BB962C8B-B14F-4D97-AF65-F5344CB8AC3E}">
+        <p14:creationId xmlns:p14="http://schemas.microsoft.com/office/powerpoint/2010/main" val="3573365039"/>
+      </p:ext>
+    </p:extLst>
+  </p:cSld>
+  <p:clrMapOvr>
+    <a:masterClrMapping/>
+  </p:clrMapOvr>
+</p:sld>
+</file>
+
+<file path=ppt/slides/slide39.xml><?xml version="1.0" encoding="utf-8"?>
+<p:sld xmlns:a="http://schemas.openxmlformats.org/drawingml/2006/main" xmlns:r="http://schemas.openxmlformats.org/officeDocument/2006/relationships" xmlns:p="http://schemas.openxmlformats.org/presentationml/2006/main">
+  <p:cSld>
+    <p:spTree>
+      <p:nvGrpSpPr>
+        <p:cNvPr id="1" name=""/>
+        <p:cNvGrpSpPr/>
+        <p:nvPr/>
+      </p:nvGrpSpPr>
+      <p:grpSpPr>
+        <a:xfrm>
+          <a:off x="0" y="0"/>
+          <a:ext cx="0" cy="0"/>
+          <a:chOff x="0" y="0"/>
+          <a:chExt cx="0" cy="0"/>
+        </a:xfrm>
+      </p:grpSpPr>
+      <p:sp>
+        <p:nvSpPr>
+          <p:cNvPr id="2" name="Title 1">
+            <a:extLst>
+              <a:ext uri="{FF2B5EF4-FFF2-40B4-BE49-F238E27FC236}">
                 <a16:creationId xmlns:a16="http://schemas.microsoft.com/office/drawing/2014/main" id="{E743D407-5B53-49A7-9907-E801EA7FFD8E}"/>
               </a:ext>
             </a:extLst>
@@ -40238,7 +40823,7 @@
           <a:p>
             <a:fld id="{20F37917-FD3A-4669-9018-DA04BCDD3D75}" type="slidenum">
               <a:rPr lang="en-US" smtClean="0"/>
-              <a:t>38</a:t>
+              <a:t>39</a:t>
             </a:fld>
             <a:endParaRPr lang="en-US"/>
           </a:p>

</xml_diff>

<commit_message>
updated activity slide, removed old link
</commit_message>
<xml_diff>
--- a/Slides/Module 05 Concurrency Patterns in Typescript.pptx
+++ b/Slides/Module 05 Concurrency Patterns in Typescript.pptx
@@ -1008,7 +1008,7 @@
           <a:p>
             <a:r>
               <a:rPr lang="en-US" dirty="0"/>
-              <a:t>For the rest of this lesson, we’ll look at a more interesting example, where we will make multiple requests to a web service. This slide documents the operations that this web service supports. We’ll discuss more how this document is structured and what all of the words mean in the next lesson, on REST</a:t>
+              <a:t>For the rest of this lesson, we’ll look at a more interesting example, where we will make multiple requests to a web service. This slide documents the operations that this web service supports. </a:t>
             </a:r>
           </a:p>
           <a:p>
@@ -1793,16 +1793,6 @@
               <a:rPr lang="en-US" dirty="0"/>
               <a:t>&lt;read slide&gt;</a:t>
             </a:r>
-          </a:p>
-          <a:p>
-            <a:endParaRPr lang="en-US" dirty="0"/>
-          </a:p>
-          <a:p>
-            <a:r>
-              <a:rPr lang="en-US" dirty="0"/>
-              <a:t>Next lesson will dive into REST and how this server works.</a:t>
-            </a:r>
-            <a:endParaRPr dirty="0"/>
           </a:p>
         </p:txBody>
       </p:sp>
@@ -13293,7 +13283,7 @@
           </a:ln>
           <a:extLst>
             <a:ext uri="{C572A759-6A51-4108-AA02-DFA0A04FC94B}">
-              <ma14:wrappingTextBoxFlag xmlns="" xmlns:m="http://schemas.openxmlformats.org/officeDocument/2006/math" xmlns:a14="http://schemas.microsoft.com/office/drawing/2010/main" xmlns:ma14="http://schemas.microsoft.com/office/mac/drawingml/2011/main" val="1"/>
+              <ma14:wrappingTextBoxFlag xmlns:ma14="http://schemas.microsoft.com/office/mac/drawingml/2011/main" xmlns:a14="http://schemas.microsoft.com/office/drawing/2010/main" xmlns:m="http://schemas.openxmlformats.org/officeDocument/2006/math" xmlns="" val="1"/>
             </a:ext>
           </a:extLst>
         </p:spPr>
@@ -13882,7 +13872,7 @@
           </a:ln>
           <a:extLst>
             <a:ext uri="{C572A759-6A51-4108-AA02-DFA0A04FC94B}">
-              <ma14:wrappingTextBoxFlag xmlns="" xmlns:m="http://schemas.openxmlformats.org/officeDocument/2006/math" xmlns:a14="http://schemas.microsoft.com/office/drawing/2010/main" xmlns:ma14="http://schemas.microsoft.com/office/mac/drawingml/2011/main" val="1"/>
+              <ma14:wrappingTextBoxFlag xmlns:ma14="http://schemas.microsoft.com/office/mac/drawingml/2011/main" xmlns:a14="http://schemas.microsoft.com/office/drawing/2010/main" xmlns:m="http://schemas.openxmlformats.org/officeDocument/2006/math" xmlns="" val="1"/>
             </a:ext>
           </a:extLst>
         </p:spPr>
@@ -15083,7 +15073,7 @@
             <a:effectLst/>
             <a:extLst>
               <a:ext uri="{C572A759-6A51-4108-AA02-DFA0A04FC94B}">
-                <ma14:wrappingTextBoxFlag xmlns="" xmlns:m="http://schemas.openxmlformats.org/officeDocument/2006/math" xmlns:a14="http://schemas.microsoft.com/office/drawing/2010/main" xmlns:ma14="http://schemas.microsoft.com/office/mac/drawingml/2011/main" val="1"/>
+                <ma14:wrappingTextBoxFlag xmlns:ma14="http://schemas.microsoft.com/office/mac/drawingml/2011/main" xmlns:a14="http://schemas.microsoft.com/office/drawing/2010/main" xmlns:m="http://schemas.openxmlformats.org/officeDocument/2006/math" xmlns="" val="1"/>
               </a:ext>
             </a:extLst>
           </p:spPr>
@@ -15152,7 +15142,7 @@
             <a:effectLst/>
             <a:extLst>
               <a:ext uri="{C572A759-6A51-4108-AA02-DFA0A04FC94B}">
-                <ma14:wrappingTextBoxFlag xmlns="" xmlns:m="http://schemas.openxmlformats.org/officeDocument/2006/math" xmlns:a14="http://schemas.microsoft.com/office/drawing/2010/main" xmlns:ma14="http://schemas.microsoft.com/office/mac/drawingml/2011/main" val="1"/>
+                <ma14:wrappingTextBoxFlag xmlns:ma14="http://schemas.microsoft.com/office/mac/drawingml/2011/main" xmlns:a14="http://schemas.microsoft.com/office/drawing/2010/main" xmlns:m="http://schemas.openxmlformats.org/officeDocument/2006/math" xmlns="" val="1"/>
               </a:ext>
             </a:extLst>
           </p:spPr>
@@ -15218,7 +15208,7 @@
             </a:ln>
             <a:extLst>
               <a:ext uri="{C572A759-6A51-4108-AA02-DFA0A04FC94B}">
-                <ma14:wrappingTextBoxFlag xmlns="" xmlns:m="http://schemas.openxmlformats.org/officeDocument/2006/math" xmlns:a14="http://schemas.microsoft.com/office/drawing/2010/main" xmlns:ma14="http://schemas.microsoft.com/office/mac/drawingml/2011/main" val="1"/>
+                <ma14:wrappingTextBoxFlag xmlns:ma14="http://schemas.microsoft.com/office/mac/drawingml/2011/main" xmlns:a14="http://schemas.microsoft.com/office/drawing/2010/main" xmlns:m="http://schemas.openxmlformats.org/officeDocument/2006/math" xmlns="" val="1"/>
               </a:ext>
             </a:extLst>
           </p:spPr>
@@ -15276,7 +15266,7 @@
             </a:ln>
             <a:extLst>
               <a:ext uri="{C572A759-6A51-4108-AA02-DFA0A04FC94B}">
-                <ma14:wrappingTextBoxFlag xmlns="" xmlns:m="http://schemas.openxmlformats.org/officeDocument/2006/math" xmlns:a14="http://schemas.microsoft.com/office/drawing/2010/main" xmlns:ma14="http://schemas.microsoft.com/office/mac/drawingml/2011/main" val="1"/>
+                <ma14:wrappingTextBoxFlag xmlns:ma14="http://schemas.microsoft.com/office/mac/drawingml/2011/main" xmlns:a14="http://schemas.microsoft.com/office/drawing/2010/main" xmlns:m="http://schemas.openxmlformats.org/officeDocument/2006/math" xmlns="" val="1"/>
               </a:ext>
             </a:extLst>
           </p:spPr>
@@ -15357,7 +15347,7 @@
             <a:effectLst/>
             <a:extLst>
               <a:ext uri="{C572A759-6A51-4108-AA02-DFA0A04FC94B}">
-                <ma14:wrappingTextBoxFlag xmlns="" xmlns:m="http://schemas.openxmlformats.org/officeDocument/2006/math" xmlns:a14="http://schemas.microsoft.com/office/drawing/2010/main" xmlns:ma14="http://schemas.microsoft.com/office/mac/drawingml/2011/main" val="1"/>
+                <ma14:wrappingTextBoxFlag xmlns:ma14="http://schemas.microsoft.com/office/mac/drawingml/2011/main" xmlns:a14="http://schemas.microsoft.com/office/drawing/2010/main" xmlns:m="http://schemas.openxmlformats.org/officeDocument/2006/math" xmlns="" val="1"/>
               </a:ext>
             </a:extLst>
           </p:spPr>
@@ -15430,7 +15420,7 @@
             <a:effectLst/>
             <a:extLst>
               <a:ext uri="{C572A759-6A51-4108-AA02-DFA0A04FC94B}">
-                <ma14:wrappingTextBoxFlag xmlns="" xmlns:m="http://schemas.openxmlformats.org/officeDocument/2006/math" xmlns:a14="http://schemas.microsoft.com/office/drawing/2010/main" xmlns:ma14="http://schemas.microsoft.com/office/mac/drawingml/2011/main" val="1"/>
+                <ma14:wrappingTextBoxFlag xmlns:ma14="http://schemas.microsoft.com/office/mac/drawingml/2011/main" xmlns:a14="http://schemas.microsoft.com/office/drawing/2010/main" xmlns:m="http://schemas.openxmlformats.org/officeDocument/2006/math" xmlns="" val="1"/>
               </a:ext>
             </a:extLst>
           </p:spPr>
@@ -15496,7 +15486,7 @@
             </a:ln>
             <a:extLst>
               <a:ext uri="{C572A759-6A51-4108-AA02-DFA0A04FC94B}">
-                <ma14:wrappingTextBoxFlag xmlns="" xmlns:m="http://schemas.openxmlformats.org/officeDocument/2006/math" xmlns:a14="http://schemas.microsoft.com/office/drawing/2010/main" xmlns:ma14="http://schemas.microsoft.com/office/mac/drawingml/2011/main" val="1"/>
+                <ma14:wrappingTextBoxFlag xmlns:ma14="http://schemas.microsoft.com/office/mac/drawingml/2011/main" xmlns:a14="http://schemas.microsoft.com/office/drawing/2010/main" xmlns:m="http://schemas.openxmlformats.org/officeDocument/2006/math" xmlns="" val="1"/>
               </a:ext>
             </a:extLst>
           </p:spPr>
@@ -15554,7 +15544,7 @@
             </a:ln>
             <a:extLst>
               <a:ext uri="{C572A759-6A51-4108-AA02-DFA0A04FC94B}">
-                <ma14:wrappingTextBoxFlag xmlns="" xmlns:m="http://schemas.openxmlformats.org/officeDocument/2006/math" xmlns:a14="http://schemas.microsoft.com/office/drawing/2010/main" xmlns:ma14="http://schemas.microsoft.com/office/mac/drawingml/2011/main" val="1"/>
+                <ma14:wrappingTextBoxFlag xmlns:ma14="http://schemas.microsoft.com/office/mac/drawingml/2011/main" xmlns:a14="http://schemas.microsoft.com/office/drawing/2010/main" xmlns:m="http://schemas.openxmlformats.org/officeDocument/2006/math" xmlns="" val="1"/>
               </a:ext>
             </a:extLst>
           </p:spPr>
@@ -15635,7 +15625,7 @@
             <a:effectLst/>
             <a:extLst>
               <a:ext uri="{C572A759-6A51-4108-AA02-DFA0A04FC94B}">
-                <ma14:wrappingTextBoxFlag xmlns="" xmlns:m="http://schemas.openxmlformats.org/officeDocument/2006/math" xmlns:a14="http://schemas.microsoft.com/office/drawing/2010/main" xmlns:ma14="http://schemas.microsoft.com/office/mac/drawingml/2011/main" val="1"/>
+                <ma14:wrappingTextBoxFlag xmlns:ma14="http://schemas.microsoft.com/office/mac/drawingml/2011/main" xmlns:a14="http://schemas.microsoft.com/office/drawing/2010/main" xmlns:m="http://schemas.openxmlformats.org/officeDocument/2006/math" xmlns="" val="1"/>
               </a:ext>
             </a:extLst>
           </p:spPr>
@@ -15708,7 +15698,7 @@
             <a:effectLst/>
             <a:extLst>
               <a:ext uri="{C572A759-6A51-4108-AA02-DFA0A04FC94B}">
-                <ma14:wrappingTextBoxFlag xmlns="" xmlns:m="http://schemas.openxmlformats.org/officeDocument/2006/math" xmlns:a14="http://schemas.microsoft.com/office/drawing/2010/main" xmlns:ma14="http://schemas.microsoft.com/office/mac/drawingml/2011/main" val="1"/>
+                <ma14:wrappingTextBoxFlag xmlns:ma14="http://schemas.microsoft.com/office/mac/drawingml/2011/main" xmlns:a14="http://schemas.microsoft.com/office/drawing/2010/main" xmlns:m="http://schemas.openxmlformats.org/officeDocument/2006/math" xmlns="" val="1"/>
               </a:ext>
             </a:extLst>
           </p:spPr>
@@ -15774,7 +15764,7 @@
             </a:ln>
             <a:extLst>
               <a:ext uri="{C572A759-6A51-4108-AA02-DFA0A04FC94B}">
-                <ma14:wrappingTextBoxFlag xmlns="" xmlns:m="http://schemas.openxmlformats.org/officeDocument/2006/math" xmlns:a14="http://schemas.microsoft.com/office/drawing/2010/main" xmlns:ma14="http://schemas.microsoft.com/office/mac/drawingml/2011/main" val="1"/>
+                <ma14:wrappingTextBoxFlag xmlns:ma14="http://schemas.microsoft.com/office/mac/drawingml/2011/main" xmlns:a14="http://schemas.microsoft.com/office/drawing/2010/main" xmlns:m="http://schemas.openxmlformats.org/officeDocument/2006/math" xmlns="" val="1"/>
               </a:ext>
             </a:extLst>
           </p:spPr>
@@ -15832,7 +15822,7 @@
             </a:ln>
             <a:extLst>
               <a:ext uri="{C572A759-6A51-4108-AA02-DFA0A04FC94B}">
-                <ma14:wrappingTextBoxFlag xmlns="" xmlns:m="http://schemas.openxmlformats.org/officeDocument/2006/math" xmlns:a14="http://schemas.microsoft.com/office/drawing/2010/main" xmlns:ma14="http://schemas.microsoft.com/office/mac/drawingml/2011/main" val="1"/>
+                <ma14:wrappingTextBoxFlag xmlns:ma14="http://schemas.microsoft.com/office/mac/drawingml/2011/main" xmlns:a14="http://schemas.microsoft.com/office/drawing/2010/main" xmlns:m="http://schemas.openxmlformats.org/officeDocument/2006/math" xmlns="" val="1"/>
               </a:ext>
             </a:extLst>
           </p:spPr>
@@ -15913,7 +15903,7 @@
             <a:effectLst/>
             <a:extLst>
               <a:ext uri="{C572A759-6A51-4108-AA02-DFA0A04FC94B}">
-                <ma14:wrappingTextBoxFlag xmlns="" xmlns:m="http://schemas.openxmlformats.org/officeDocument/2006/math" xmlns:a14="http://schemas.microsoft.com/office/drawing/2010/main" xmlns:ma14="http://schemas.microsoft.com/office/mac/drawingml/2011/main" val="1"/>
+                <ma14:wrappingTextBoxFlag xmlns:ma14="http://schemas.microsoft.com/office/mac/drawingml/2011/main" xmlns:a14="http://schemas.microsoft.com/office/drawing/2010/main" xmlns:m="http://schemas.openxmlformats.org/officeDocument/2006/math" xmlns="" val="1"/>
               </a:ext>
             </a:extLst>
           </p:spPr>
@@ -15982,7 +15972,7 @@
             <a:effectLst/>
             <a:extLst>
               <a:ext uri="{C572A759-6A51-4108-AA02-DFA0A04FC94B}">
-                <ma14:wrappingTextBoxFlag xmlns="" xmlns:m="http://schemas.openxmlformats.org/officeDocument/2006/math" xmlns:a14="http://schemas.microsoft.com/office/drawing/2010/main" xmlns:ma14="http://schemas.microsoft.com/office/mac/drawingml/2011/main" val="1"/>
+                <ma14:wrappingTextBoxFlag xmlns:ma14="http://schemas.microsoft.com/office/mac/drawingml/2011/main" xmlns:a14="http://schemas.microsoft.com/office/drawing/2010/main" xmlns:m="http://schemas.openxmlformats.org/officeDocument/2006/math" xmlns="" val="1"/>
               </a:ext>
             </a:extLst>
           </p:spPr>
@@ -16048,7 +16038,7 @@
             </a:ln>
             <a:extLst>
               <a:ext uri="{C572A759-6A51-4108-AA02-DFA0A04FC94B}">
-                <ma14:wrappingTextBoxFlag xmlns="" xmlns:m="http://schemas.openxmlformats.org/officeDocument/2006/math" xmlns:a14="http://schemas.microsoft.com/office/drawing/2010/main" xmlns:ma14="http://schemas.microsoft.com/office/mac/drawingml/2011/main" val="1"/>
+                <ma14:wrappingTextBoxFlag xmlns:ma14="http://schemas.microsoft.com/office/mac/drawingml/2011/main" xmlns:a14="http://schemas.microsoft.com/office/drawing/2010/main" xmlns:m="http://schemas.openxmlformats.org/officeDocument/2006/math" xmlns="" val="1"/>
               </a:ext>
             </a:extLst>
           </p:spPr>
@@ -16106,7 +16096,7 @@
             </a:ln>
             <a:extLst>
               <a:ext uri="{C572A759-6A51-4108-AA02-DFA0A04FC94B}">
-                <ma14:wrappingTextBoxFlag xmlns="" xmlns:m="http://schemas.openxmlformats.org/officeDocument/2006/math" xmlns:a14="http://schemas.microsoft.com/office/drawing/2010/main" xmlns:ma14="http://schemas.microsoft.com/office/mac/drawingml/2011/main" val="1"/>
+                <ma14:wrappingTextBoxFlag xmlns:ma14="http://schemas.microsoft.com/office/mac/drawingml/2011/main" xmlns:a14="http://schemas.microsoft.com/office/drawing/2010/main" xmlns:m="http://schemas.openxmlformats.org/officeDocument/2006/math" xmlns="" val="1"/>
               </a:ext>
             </a:extLst>
           </p:spPr>
@@ -16187,7 +16177,7 @@
             <a:effectLst/>
             <a:extLst>
               <a:ext uri="{C572A759-6A51-4108-AA02-DFA0A04FC94B}">
-                <ma14:wrappingTextBoxFlag xmlns="" xmlns:m="http://schemas.openxmlformats.org/officeDocument/2006/math" xmlns:a14="http://schemas.microsoft.com/office/drawing/2010/main" xmlns:ma14="http://schemas.microsoft.com/office/mac/drawingml/2011/main" val="1"/>
+                <ma14:wrappingTextBoxFlag xmlns:ma14="http://schemas.microsoft.com/office/mac/drawingml/2011/main" xmlns:a14="http://schemas.microsoft.com/office/drawing/2010/main" xmlns:m="http://schemas.openxmlformats.org/officeDocument/2006/math" xmlns="" val="1"/>
               </a:ext>
             </a:extLst>
           </p:spPr>
@@ -16260,7 +16250,7 @@
             <a:effectLst/>
             <a:extLst>
               <a:ext uri="{C572A759-6A51-4108-AA02-DFA0A04FC94B}">
-                <ma14:wrappingTextBoxFlag xmlns="" xmlns:m="http://schemas.openxmlformats.org/officeDocument/2006/math" xmlns:a14="http://schemas.microsoft.com/office/drawing/2010/main" xmlns:ma14="http://schemas.microsoft.com/office/mac/drawingml/2011/main" val="1"/>
+                <ma14:wrappingTextBoxFlag xmlns:ma14="http://schemas.microsoft.com/office/mac/drawingml/2011/main" xmlns:a14="http://schemas.microsoft.com/office/drawing/2010/main" xmlns:m="http://schemas.openxmlformats.org/officeDocument/2006/math" xmlns="" val="1"/>
               </a:ext>
             </a:extLst>
           </p:spPr>
@@ -16326,7 +16316,7 @@
             </a:ln>
             <a:extLst>
               <a:ext uri="{C572A759-6A51-4108-AA02-DFA0A04FC94B}">
-                <ma14:wrappingTextBoxFlag xmlns="" xmlns:m="http://schemas.openxmlformats.org/officeDocument/2006/math" xmlns:a14="http://schemas.microsoft.com/office/drawing/2010/main" xmlns:ma14="http://schemas.microsoft.com/office/mac/drawingml/2011/main" val="1"/>
+                <ma14:wrappingTextBoxFlag xmlns:ma14="http://schemas.microsoft.com/office/mac/drawingml/2011/main" xmlns:a14="http://schemas.microsoft.com/office/drawing/2010/main" xmlns:m="http://schemas.openxmlformats.org/officeDocument/2006/math" xmlns="" val="1"/>
               </a:ext>
             </a:extLst>
           </p:spPr>
@@ -16384,7 +16374,7 @@
             </a:ln>
             <a:extLst>
               <a:ext uri="{C572A759-6A51-4108-AA02-DFA0A04FC94B}">
-                <ma14:wrappingTextBoxFlag xmlns="" xmlns:m="http://schemas.openxmlformats.org/officeDocument/2006/math" xmlns:a14="http://schemas.microsoft.com/office/drawing/2010/main" xmlns:ma14="http://schemas.microsoft.com/office/mac/drawingml/2011/main" val="1"/>
+                <ma14:wrappingTextBoxFlag xmlns:ma14="http://schemas.microsoft.com/office/mac/drawingml/2011/main" xmlns:a14="http://schemas.microsoft.com/office/drawing/2010/main" xmlns:m="http://schemas.openxmlformats.org/officeDocument/2006/math" xmlns="" val="1"/>
               </a:ext>
             </a:extLst>
           </p:spPr>
@@ -16465,7 +16455,7 @@
             <a:effectLst/>
             <a:extLst>
               <a:ext uri="{C572A759-6A51-4108-AA02-DFA0A04FC94B}">
-                <ma14:wrappingTextBoxFlag xmlns="" xmlns:m="http://schemas.openxmlformats.org/officeDocument/2006/math" xmlns:a14="http://schemas.microsoft.com/office/drawing/2010/main" xmlns:ma14="http://schemas.microsoft.com/office/mac/drawingml/2011/main" val="1"/>
+                <ma14:wrappingTextBoxFlag xmlns:ma14="http://schemas.microsoft.com/office/mac/drawingml/2011/main" xmlns:a14="http://schemas.microsoft.com/office/drawing/2010/main" xmlns:m="http://schemas.openxmlformats.org/officeDocument/2006/math" xmlns="" val="1"/>
               </a:ext>
             </a:extLst>
           </p:spPr>
@@ -16538,7 +16528,7 @@
             <a:effectLst/>
             <a:extLst>
               <a:ext uri="{C572A759-6A51-4108-AA02-DFA0A04FC94B}">
-                <ma14:wrappingTextBoxFlag xmlns="" xmlns:m="http://schemas.openxmlformats.org/officeDocument/2006/math" xmlns:a14="http://schemas.microsoft.com/office/drawing/2010/main" xmlns:ma14="http://schemas.microsoft.com/office/mac/drawingml/2011/main" val="1"/>
+                <ma14:wrappingTextBoxFlag xmlns:ma14="http://schemas.microsoft.com/office/mac/drawingml/2011/main" xmlns:a14="http://schemas.microsoft.com/office/drawing/2010/main" xmlns:m="http://schemas.openxmlformats.org/officeDocument/2006/math" xmlns="" val="1"/>
               </a:ext>
             </a:extLst>
           </p:spPr>
@@ -16604,7 +16594,7 @@
             </a:ln>
             <a:extLst>
               <a:ext uri="{C572A759-6A51-4108-AA02-DFA0A04FC94B}">
-                <ma14:wrappingTextBoxFlag xmlns="" xmlns:m="http://schemas.openxmlformats.org/officeDocument/2006/math" xmlns:a14="http://schemas.microsoft.com/office/drawing/2010/main" xmlns:ma14="http://schemas.microsoft.com/office/mac/drawingml/2011/main" val="1"/>
+                <ma14:wrappingTextBoxFlag xmlns:ma14="http://schemas.microsoft.com/office/mac/drawingml/2011/main" xmlns:a14="http://schemas.microsoft.com/office/drawing/2010/main" xmlns:m="http://schemas.openxmlformats.org/officeDocument/2006/math" xmlns="" val="1"/>
               </a:ext>
             </a:extLst>
           </p:spPr>
@@ -16662,7 +16652,7 @@
             </a:ln>
             <a:extLst>
               <a:ext uri="{C572A759-6A51-4108-AA02-DFA0A04FC94B}">
-                <ma14:wrappingTextBoxFlag xmlns="" xmlns:m="http://schemas.openxmlformats.org/officeDocument/2006/math" xmlns:a14="http://schemas.microsoft.com/office/drawing/2010/main" xmlns:ma14="http://schemas.microsoft.com/office/mac/drawingml/2011/main" val="1"/>
+                <ma14:wrappingTextBoxFlag xmlns:ma14="http://schemas.microsoft.com/office/mac/drawingml/2011/main" xmlns:a14="http://schemas.microsoft.com/office/drawing/2010/main" xmlns:m="http://schemas.openxmlformats.org/officeDocument/2006/math" xmlns="" val="1"/>
               </a:ext>
             </a:extLst>
           </p:spPr>
@@ -16721,7 +16711,7 @@
           </a:ln>
           <a:extLst>
             <a:ext uri="{C572A759-6A51-4108-AA02-DFA0A04FC94B}">
-              <ma14:wrappingTextBoxFlag xmlns="" xmlns:m="http://schemas.openxmlformats.org/officeDocument/2006/math" xmlns:a14="http://schemas.microsoft.com/office/drawing/2010/main" xmlns:ma14="http://schemas.microsoft.com/office/mac/drawingml/2011/main" val="1"/>
+              <ma14:wrappingTextBoxFlag xmlns:ma14="http://schemas.microsoft.com/office/mac/drawingml/2011/main" xmlns:a14="http://schemas.microsoft.com/office/drawing/2010/main" xmlns:m="http://schemas.openxmlformats.org/officeDocument/2006/math" xmlns="" val="1"/>
             </a:ext>
           </a:extLst>
         </p:spPr>
@@ -16779,7 +16769,7 @@
           </a:ln>
           <a:extLst>
             <a:ext uri="{C572A759-6A51-4108-AA02-DFA0A04FC94B}">
-              <ma14:wrappingTextBoxFlag xmlns="" xmlns:m="http://schemas.openxmlformats.org/officeDocument/2006/math" xmlns:a14="http://schemas.microsoft.com/office/drawing/2010/main" xmlns:ma14="http://schemas.microsoft.com/office/mac/drawingml/2011/main" val="1"/>
+              <ma14:wrappingTextBoxFlag xmlns:ma14="http://schemas.microsoft.com/office/mac/drawingml/2011/main" xmlns:a14="http://schemas.microsoft.com/office/drawing/2010/main" xmlns:m="http://schemas.openxmlformats.org/officeDocument/2006/math" xmlns="" val="1"/>
             </a:ext>
           </a:extLst>
         </p:spPr>
@@ -17023,7 +17013,7 @@
             </a:ln>
             <a:extLst>
               <a:ext uri="{C572A759-6A51-4108-AA02-DFA0A04FC94B}">
-                <ma14:wrappingTextBoxFlag xmlns="" xmlns:m="http://schemas.openxmlformats.org/officeDocument/2006/math" xmlns:a14="http://schemas.microsoft.com/office/drawing/2010/main" xmlns:ma14="http://schemas.microsoft.com/office/mac/drawingml/2011/main" val="1"/>
+                <ma14:wrappingTextBoxFlag xmlns:ma14="http://schemas.microsoft.com/office/mac/drawingml/2011/main" xmlns:a14="http://schemas.microsoft.com/office/drawing/2010/main" xmlns:m="http://schemas.openxmlformats.org/officeDocument/2006/math" xmlns="" val="1"/>
               </a:ext>
             </a:extLst>
           </p:spPr>
@@ -17575,7 +17565,7 @@
             </a:ln>
             <a:extLst>
               <a:ext uri="{C572A759-6A51-4108-AA02-DFA0A04FC94B}">
-                <ma14:wrappingTextBoxFlag xmlns="" xmlns:m="http://schemas.openxmlformats.org/officeDocument/2006/math" xmlns:a14="http://schemas.microsoft.com/office/drawing/2010/main" xmlns:ma14="http://schemas.microsoft.com/office/mac/drawingml/2011/main" val="1"/>
+                <ma14:wrappingTextBoxFlag xmlns:ma14="http://schemas.microsoft.com/office/mac/drawingml/2011/main" xmlns:a14="http://schemas.microsoft.com/office/drawing/2010/main" xmlns:m="http://schemas.openxmlformats.org/officeDocument/2006/math" xmlns="" val="1"/>
               </a:ext>
             </a:extLst>
           </p:spPr>
@@ -18798,7 +18788,7 @@
           </a:prstGeom>
           <a:extLst>
             <a:ext uri="{C572A759-6A51-4108-AA02-DFA0A04FC94B}">
-              <ma14:wrappingTextBoxFlag xmlns="" xmlns:m="http://schemas.openxmlformats.org/officeDocument/2006/math" xmlns:a14="http://schemas.microsoft.com/office/drawing/2010/main" xmlns:ma14="http://schemas.microsoft.com/office/mac/drawingml/2011/main" val="1"/>
+              <ma14:wrappingTextBoxFlag xmlns:ma14="http://schemas.microsoft.com/office/mac/drawingml/2011/main" xmlns:a14="http://schemas.microsoft.com/office/drawing/2010/main" xmlns:m="http://schemas.openxmlformats.org/officeDocument/2006/math" xmlns="" val="1"/>
             </a:ext>
           </a:extLst>
         </p:spPr>
@@ -19545,7 +19535,7 @@
             <a:effectLst/>
             <a:extLst>
               <a:ext uri="{C572A759-6A51-4108-AA02-DFA0A04FC94B}">
-                <ma14:wrappingTextBoxFlag xmlns:ma14="http://schemas.microsoft.com/office/mac/drawingml/2011/main" xmlns:a14="http://schemas.microsoft.com/office/drawing/2010/main" xmlns:m="http://schemas.openxmlformats.org/officeDocument/2006/math" xmlns="" val="1"/>
+                <ma14:wrappingTextBoxFlag xmlns="" xmlns:m="http://schemas.openxmlformats.org/officeDocument/2006/math" xmlns:a14="http://schemas.microsoft.com/office/drawing/2010/main" xmlns:ma14="http://schemas.microsoft.com/office/mac/drawingml/2011/main" val="1"/>
               </a:ext>
             </a:extLst>
           </p:spPr>
@@ -19828,7 +19818,7 @@
             <a:effectLst/>
             <a:extLst>
               <a:ext uri="{C572A759-6A51-4108-AA02-DFA0A04FC94B}">
-                <ma14:wrappingTextBoxFlag xmlns:ma14="http://schemas.microsoft.com/office/mac/drawingml/2011/main" xmlns:a14="http://schemas.microsoft.com/office/drawing/2010/main" xmlns:m="http://schemas.openxmlformats.org/officeDocument/2006/math" xmlns="" val="1"/>
+                <ma14:wrappingTextBoxFlag xmlns="" xmlns:m="http://schemas.openxmlformats.org/officeDocument/2006/math" xmlns:a14="http://schemas.microsoft.com/office/drawing/2010/main" xmlns:ma14="http://schemas.microsoft.com/office/mac/drawingml/2011/main" val="1"/>
               </a:ext>
             </a:extLst>
           </p:spPr>
@@ -20962,7 +20952,7 @@
             <a:effectLst/>
             <a:extLst>
               <a:ext uri="{C572A759-6A51-4108-AA02-DFA0A04FC94B}">
-                <ma14:wrappingTextBoxFlag xmlns="" xmlns:m="http://schemas.openxmlformats.org/officeDocument/2006/math" xmlns:a14="http://schemas.microsoft.com/office/drawing/2010/main" xmlns:ma14="http://schemas.microsoft.com/office/mac/drawingml/2011/main" val="1"/>
+                <ma14:wrappingTextBoxFlag xmlns:ma14="http://schemas.microsoft.com/office/mac/drawingml/2011/main" xmlns:a14="http://schemas.microsoft.com/office/drawing/2010/main" xmlns:m="http://schemas.openxmlformats.org/officeDocument/2006/math" xmlns="" val="1"/>
               </a:ext>
             </a:extLst>
           </p:spPr>
@@ -21227,7 +21217,7 @@
             <a:effectLst/>
             <a:extLst>
               <a:ext uri="{C572A759-6A51-4108-AA02-DFA0A04FC94B}">
-                <ma14:wrappingTextBoxFlag xmlns="" xmlns:m="http://schemas.openxmlformats.org/officeDocument/2006/math" xmlns:a14="http://schemas.microsoft.com/office/drawing/2010/main" xmlns:ma14="http://schemas.microsoft.com/office/mac/drawingml/2011/main" val="1"/>
+                <ma14:wrappingTextBoxFlag xmlns:ma14="http://schemas.microsoft.com/office/mac/drawingml/2011/main" xmlns:a14="http://schemas.microsoft.com/office/drawing/2010/main" xmlns:m="http://schemas.openxmlformats.org/officeDocument/2006/math" xmlns="" val="1"/>
               </a:ext>
             </a:extLst>
           </p:spPr>
@@ -22817,7 +22807,7 @@
             <a:effectLst/>
             <a:extLst>
               <a:ext uri="{C572A759-6A51-4108-AA02-DFA0A04FC94B}">
-                <ma14:wrappingTextBoxFlag xmlns:ma14="http://schemas.microsoft.com/office/mac/drawingml/2011/main" xmlns:a14="http://schemas.microsoft.com/office/drawing/2010/main" xmlns:m="http://schemas.openxmlformats.org/officeDocument/2006/math" xmlns="" val="1"/>
+                <ma14:wrappingTextBoxFlag xmlns="" xmlns:m="http://schemas.openxmlformats.org/officeDocument/2006/math" xmlns:a14="http://schemas.microsoft.com/office/drawing/2010/main" xmlns:ma14="http://schemas.microsoft.com/office/mac/drawingml/2011/main" val="1"/>
               </a:ext>
             </a:extLst>
           </p:spPr>
@@ -27133,7 +27123,7 @@
             <a:effectLst/>
             <a:extLst>
               <a:ext uri="{C572A759-6A51-4108-AA02-DFA0A04FC94B}">
-                <ma14:wrappingTextBoxFlag xmlns:ma14="http://schemas.microsoft.com/office/mac/drawingml/2011/main" xmlns:a14="http://schemas.microsoft.com/office/drawing/2010/main" xmlns:m="http://schemas.openxmlformats.org/officeDocument/2006/math" xmlns="" val="1"/>
+                <ma14:wrappingTextBoxFlag xmlns="" xmlns:m="http://schemas.openxmlformats.org/officeDocument/2006/math" xmlns:a14="http://schemas.microsoft.com/office/drawing/2010/main" xmlns:ma14="http://schemas.microsoft.com/office/mac/drawingml/2011/main" val="1"/>
               </a:ext>
             </a:extLst>
           </p:spPr>
@@ -27436,7 +27426,7 @@
           </a:prstGeom>
           <a:extLst>
             <a:ext uri="{C572A759-6A51-4108-AA02-DFA0A04FC94B}">
-              <ma14:wrappingTextBoxFlag xmlns:ma14="http://schemas.microsoft.com/office/mac/drawingml/2011/main" xmlns:a14="http://schemas.microsoft.com/office/drawing/2010/main" xmlns:m="http://schemas.openxmlformats.org/officeDocument/2006/math" xmlns="" val="1"/>
+              <ma14:wrappingTextBoxFlag xmlns="" xmlns:m="http://schemas.openxmlformats.org/officeDocument/2006/math" xmlns:a14="http://schemas.microsoft.com/office/drawing/2010/main" xmlns:ma14="http://schemas.microsoft.com/office/mac/drawingml/2011/main" val="1"/>
             </a:ext>
           </a:extLst>
         </p:spPr>
@@ -27474,7 +27464,7 @@
           </a:ln>
           <a:extLst>
             <a:ext uri="{C572A759-6A51-4108-AA02-DFA0A04FC94B}">
-              <ma14:wrappingTextBoxFlag xmlns:ma14="http://schemas.microsoft.com/office/mac/drawingml/2011/main" xmlns:a14="http://schemas.microsoft.com/office/drawing/2010/main" xmlns:m="http://schemas.openxmlformats.org/officeDocument/2006/math" xmlns="" val="1"/>
+              <ma14:wrappingTextBoxFlag xmlns="" xmlns:m="http://schemas.openxmlformats.org/officeDocument/2006/math" xmlns:a14="http://schemas.microsoft.com/office/drawing/2010/main" xmlns:ma14="http://schemas.microsoft.com/office/mac/drawingml/2011/main" val="1"/>
             </a:ext>
           </a:extLst>
         </p:spPr>
@@ -28541,7 +28531,7 @@
           </a:ln>
           <a:extLst>
             <a:ext uri="{C572A759-6A51-4108-AA02-DFA0A04FC94B}">
-              <ma14:wrappingTextBoxFlag xmlns:ma14="http://schemas.microsoft.com/office/mac/drawingml/2011/main" xmlns:a14="http://schemas.microsoft.com/office/drawing/2010/main" xmlns:m="http://schemas.openxmlformats.org/officeDocument/2006/math" xmlns="" val="1"/>
+              <ma14:wrappingTextBoxFlag xmlns="" xmlns:m="http://schemas.openxmlformats.org/officeDocument/2006/math" xmlns:a14="http://schemas.microsoft.com/office/drawing/2010/main" xmlns:ma14="http://schemas.microsoft.com/office/mac/drawingml/2011/main" val="1"/>
             </a:ext>
           </a:extLst>
         </p:spPr>
@@ -29573,7 +29563,7 @@
           </a:ln>
           <a:extLst>
             <a:ext uri="{C572A759-6A51-4108-AA02-DFA0A04FC94B}">
-              <ma14:wrappingTextBoxFlag xmlns:ma14="http://schemas.microsoft.com/office/mac/drawingml/2011/main" xmlns:a14="http://schemas.microsoft.com/office/drawing/2010/main" xmlns:m="http://schemas.openxmlformats.org/officeDocument/2006/math" xmlns="" val="1"/>
+              <ma14:wrappingTextBoxFlag xmlns="" xmlns:m="http://schemas.openxmlformats.org/officeDocument/2006/math" xmlns:a14="http://schemas.microsoft.com/office/drawing/2010/main" xmlns:ma14="http://schemas.microsoft.com/office/mac/drawingml/2011/main" val="1"/>
             </a:ext>
           </a:extLst>
         </p:spPr>
@@ -29631,7 +29621,7 @@
           </a:ln>
           <a:extLst>
             <a:ext uri="{C572A759-6A51-4108-AA02-DFA0A04FC94B}">
-              <ma14:wrappingTextBoxFlag xmlns:ma14="http://schemas.microsoft.com/office/mac/drawingml/2011/main" xmlns:a14="http://schemas.microsoft.com/office/drawing/2010/main" xmlns:m="http://schemas.openxmlformats.org/officeDocument/2006/math" xmlns="" val="1"/>
+              <ma14:wrappingTextBoxFlag xmlns="" xmlns:m="http://schemas.openxmlformats.org/officeDocument/2006/math" xmlns:a14="http://schemas.microsoft.com/office/drawing/2010/main" xmlns:ma14="http://schemas.microsoft.com/office/mac/drawingml/2011/main" val="1"/>
             </a:ext>
           </a:extLst>
         </p:spPr>
@@ -29675,7 +29665,7 @@
           </a:ln>
           <a:extLst>
             <a:ext uri="{C572A759-6A51-4108-AA02-DFA0A04FC94B}">
-              <ma14:wrappingTextBoxFlag xmlns:ma14="http://schemas.microsoft.com/office/mac/drawingml/2011/main" xmlns:a14="http://schemas.microsoft.com/office/drawing/2010/main" xmlns:m="http://schemas.openxmlformats.org/officeDocument/2006/math" xmlns="" val="1"/>
+              <ma14:wrappingTextBoxFlag xmlns="" xmlns:m="http://schemas.openxmlformats.org/officeDocument/2006/math" xmlns:a14="http://schemas.microsoft.com/office/drawing/2010/main" xmlns:ma14="http://schemas.microsoft.com/office/mac/drawingml/2011/main" val="1"/>
             </a:ext>
           </a:extLst>
         </p:spPr>
@@ -29711,7 +29701,7 @@
           </a:ln>
           <a:extLst>
             <a:ext uri="{C572A759-6A51-4108-AA02-DFA0A04FC94B}">
-              <ma14:wrappingTextBoxFlag xmlns:ma14="http://schemas.microsoft.com/office/mac/drawingml/2011/main" xmlns:a14="http://schemas.microsoft.com/office/drawing/2010/main" xmlns:m="http://schemas.openxmlformats.org/officeDocument/2006/math" xmlns="" val="1"/>
+              <ma14:wrappingTextBoxFlag xmlns="" xmlns:m="http://schemas.openxmlformats.org/officeDocument/2006/math" xmlns:a14="http://schemas.microsoft.com/office/drawing/2010/main" xmlns:ma14="http://schemas.microsoft.com/office/mac/drawingml/2011/main" val="1"/>
             </a:ext>
           </a:extLst>
         </p:spPr>
@@ -29799,7 +29789,7 @@
             <a:effectLst/>
             <a:extLst>
               <a:ext uri="{C572A759-6A51-4108-AA02-DFA0A04FC94B}">
-                <ma14:wrappingTextBoxFlag xmlns:ma14="http://schemas.microsoft.com/office/mac/drawingml/2011/main" xmlns:a14="http://schemas.microsoft.com/office/drawing/2010/main" xmlns:m="http://schemas.openxmlformats.org/officeDocument/2006/math" xmlns="" val="1"/>
+                <ma14:wrappingTextBoxFlag xmlns="" xmlns:m="http://schemas.openxmlformats.org/officeDocument/2006/math" xmlns:a14="http://schemas.microsoft.com/office/drawing/2010/main" xmlns:ma14="http://schemas.microsoft.com/office/mac/drawingml/2011/main" val="1"/>
               </a:ext>
             </a:extLst>
           </p:spPr>
@@ -30061,7 +30051,7 @@
             <a:effectLst/>
             <a:extLst>
               <a:ext uri="{C572A759-6A51-4108-AA02-DFA0A04FC94B}">
-                <ma14:wrappingTextBoxFlag xmlns:ma14="http://schemas.microsoft.com/office/mac/drawingml/2011/main" xmlns:a14="http://schemas.microsoft.com/office/drawing/2010/main" xmlns:m="http://schemas.openxmlformats.org/officeDocument/2006/math" xmlns="" val="1"/>
+                <ma14:wrappingTextBoxFlag xmlns="" xmlns:m="http://schemas.openxmlformats.org/officeDocument/2006/math" xmlns:a14="http://schemas.microsoft.com/office/drawing/2010/main" xmlns:ma14="http://schemas.microsoft.com/office/mac/drawingml/2011/main" val="1"/>
               </a:ext>
             </a:extLst>
           </p:spPr>
@@ -31098,32 +31088,8 @@
                 <a:cs typeface="+mn-cs"/>
                 <a:sym typeface="Helvetica Neue"/>
               </a:rPr>
-              <a:t>Linked from course webpage for week 4, or at </a:t>
-            </a:r>
-            <a:r>
-              <a:rPr lang="en-US" sz="2400" dirty="0">
-                <a:hlinkClick r:id="rId3"/>
-              </a:rPr>
-              <a:t>https://bit.ly/34GbcN6</a:t>
-            </a:r>
-            <a:r>
-              <a:rPr lang="en-US" sz="2400" dirty="0"/>
-              <a:t>  </a:t>
-            </a:r>
-            <a:endParaRPr kumimoji="0" lang="en-US" sz="2400" b="0" i="0" u="none" strike="noStrike" cap="none" spc="0" normalizeH="0" baseline="0" dirty="0">
-              <a:ln>
-                <a:noFill/>
-              </a:ln>
-              <a:solidFill>
-                <a:srgbClr val="5E5E5E"/>
-              </a:solidFill>
-              <a:effectLst/>
-              <a:uFillTx/>
-              <a:latin typeface="+mn-lt"/>
-              <a:ea typeface="+mn-ea"/>
-              <a:cs typeface="+mn-cs"/>
-              <a:sym typeface="Helvetica Neue"/>
-            </a:endParaRPr>
+              <a:t>Linked from course webpage for Module 5</a:t>
+            </a:r>
           </a:p>
         </p:txBody>
       </p:sp>
@@ -32045,7 +32011,7 @@
           </a:prstGeom>
           <a:extLst>
             <a:ext uri="{C572A759-6A51-4108-AA02-DFA0A04FC94B}">
-              <ma14:wrappingTextBoxFlag xmlns:ma14="http://schemas.microsoft.com/office/mac/drawingml/2011/main" xmlns:a14="http://schemas.microsoft.com/office/drawing/2010/main" xmlns:m="http://schemas.openxmlformats.org/officeDocument/2006/math" xmlns="" val="1"/>
+              <ma14:wrappingTextBoxFlag xmlns="" xmlns:m="http://schemas.openxmlformats.org/officeDocument/2006/math" xmlns:a14="http://schemas.microsoft.com/office/drawing/2010/main" xmlns:ma14="http://schemas.microsoft.com/office/mac/drawingml/2011/main" val="1"/>
             </a:ext>
           </a:extLst>
         </p:spPr>
@@ -32435,7 +32401,7 @@
               </a:effectLst>
               <a:extLst>
                 <a:ext uri="{C572A759-6A51-4108-AA02-DFA0A04FC94B}">
-                  <ma14:wrappingTextBoxFlag xmlns:ma14="http://schemas.microsoft.com/office/mac/drawingml/2011/main" xmlns:a14="http://schemas.microsoft.com/office/drawing/2010/main" xmlns:m="http://schemas.openxmlformats.org/officeDocument/2006/math" xmlns="" val="1"/>
+                  <ma14:wrappingTextBoxFlag xmlns="" xmlns:m="http://schemas.openxmlformats.org/officeDocument/2006/math" xmlns:a14="http://schemas.microsoft.com/office/drawing/2010/main" xmlns:ma14="http://schemas.microsoft.com/office/mac/drawingml/2011/main" val="1"/>
                 </a:ext>
               </a:extLst>
             </p:spPr>
@@ -32505,7 +32471,7 @@
               </a:effectLst>
               <a:extLst>
                 <a:ext uri="{C572A759-6A51-4108-AA02-DFA0A04FC94B}">
-                  <ma14:wrappingTextBoxFlag xmlns:ma14="http://schemas.microsoft.com/office/mac/drawingml/2011/main" xmlns:a14="http://schemas.microsoft.com/office/drawing/2010/main" xmlns:m="http://schemas.openxmlformats.org/officeDocument/2006/math" xmlns="" val="1"/>
+                  <ma14:wrappingTextBoxFlag xmlns="" xmlns:m="http://schemas.openxmlformats.org/officeDocument/2006/math" xmlns:a14="http://schemas.microsoft.com/office/drawing/2010/main" xmlns:ma14="http://schemas.microsoft.com/office/mac/drawingml/2011/main" val="1"/>
                 </a:ext>
               </a:extLst>
             </p:spPr>
@@ -32573,7 +32539,7 @@
               </a:effectLst>
               <a:extLst>
                 <a:ext uri="{C572A759-6A51-4108-AA02-DFA0A04FC94B}">
-                  <ma14:wrappingTextBoxFlag xmlns:ma14="http://schemas.microsoft.com/office/mac/drawingml/2011/main" xmlns:a14="http://schemas.microsoft.com/office/drawing/2010/main" xmlns:m="http://schemas.openxmlformats.org/officeDocument/2006/math" xmlns="" val="1"/>
+                  <ma14:wrappingTextBoxFlag xmlns="" xmlns:m="http://schemas.openxmlformats.org/officeDocument/2006/math" xmlns:a14="http://schemas.microsoft.com/office/drawing/2010/main" xmlns:ma14="http://schemas.microsoft.com/office/mac/drawingml/2011/main" val="1"/>
                 </a:ext>
               </a:extLst>
             </p:spPr>
@@ -32661,7 +32627,7 @@
                 </a:effectLst>
                 <a:extLst>
                   <a:ext uri="{C572A759-6A51-4108-AA02-DFA0A04FC94B}">
-                    <ma14:wrappingTextBoxFlag xmlns:ma14="http://schemas.microsoft.com/office/mac/drawingml/2011/main" xmlns:a14="http://schemas.microsoft.com/office/drawing/2010/main" xmlns:m="http://schemas.openxmlformats.org/officeDocument/2006/math" xmlns="" val="1"/>
+                    <ma14:wrappingTextBoxFlag xmlns="" xmlns:m="http://schemas.openxmlformats.org/officeDocument/2006/math" xmlns:a14="http://schemas.microsoft.com/office/drawing/2010/main" xmlns:ma14="http://schemas.microsoft.com/office/mac/drawingml/2011/main" val="1"/>
                   </a:ext>
                 </a:extLst>
               </p:spPr>
@@ -32839,7 +32805,7 @@
                   <a:effectLst/>
                   <a:extLst>
                     <a:ext uri="{C572A759-6A51-4108-AA02-DFA0A04FC94B}">
-                      <ma14:wrappingTextBoxFlag xmlns:ma14="http://schemas.microsoft.com/office/mac/drawingml/2011/main" xmlns:a14="http://schemas.microsoft.com/office/drawing/2010/main" xmlns:m="http://schemas.openxmlformats.org/officeDocument/2006/math" xmlns="" val="1"/>
+                      <ma14:wrappingTextBoxFlag xmlns="" xmlns:m="http://schemas.openxmlformats.org/officeDocument/2006/math" xmlns:a14="http://schemas.microsoft.com/office/drawing/2010/main" xmlns:ma14="http://schemas.microsoft.com/office/mac/drawingml/2011/main" val="1"/>
                     </a:ext>
                   </a:extLst>
                 </p:spPr>
@@ -33039,7 +33005,7 @@
                   <a:effectLst/>
                   <a:extLst>
                     <a:ext uri="{C572A759-6A51-4108-AA02-DFA0A04FC94B}">
-                      <ma14:wrappingTextBoxFlag xmlns:ma14="http://schemas.microsoft.com/office/mac/drawingml/2011/main" xmlns:a14="http://schemas.microsoft.com/office/drawing/2010/main" xmlns:m="http://schemas.openxmlformats.org/officeDocument/2006/math" xmlns="" val="1"/>
+                      <ma14:wrappingTextBoxFlag xmlns="" xmlns:m="http://schemas.openxmlformats.org/officeDocument/2006/math" xmlns:a14="http://schemas.microsoft.com/office/drawing/2010/main" xmlns:ma14="http://schemas.microsoft.com/office/mac/drawingml/2011/main" val="1"/>
                     </a:ext>
                   </a:extLst>
                 </p:spPr>
@@ -33129,7 +33095,7 @@
                 </a:effectLst>
                 <a:extLst>
                   <a:ext uri="{C572A759-6A51-4108-AA02-DFA0A04FC94B}">
-                    <ma14:wrappingTextBoxFlag xmlns:ma14="http://schemas.microsoft.com/office/mac/drawingml/2011/main" xmlns:a14="http://schemas.microsoft.com/office/drawing/2010/main" xmlns:m="http://schemas.openxmlformats.org/officeDocument/2006/math" xmlns="" val="1"/>
+                    <ma14:wrappingTextBoxFlag xmlns="" xmlns:m="http://schemas.openxmlformats.org/officeDocument/2006/math" xmlns:a14="http://schemas.microsoft.com/office/drawing/2010/main" xmlns:ma14="http://schemas.microsoft.com/office/mac/drawingml/2011/main" val="1"/>
                   </a:ext>
                 </a:extLst>
               </p:spPr>
@@ -33307,7 +33273,7 @@
                   <a:effectLst/>
                   <a:extLst>
                     <a:ext uri="{C572A759-6A51-4108-AA02-DFA0A04FC94B}">
-                      <ma14:wrappingTextBoxFlag xmlns:ma14="http://schemas.microsoft.com/office/mac/drawingml/2011/main" xmlns:a14="http://schemas.microsoft.com/office/drawing/2010/main" xmlns:m="http://schemas.openxmlformats.org/officeDocument/2006/math" xmlns="" val="1"/>
+                      <ma14:wrappingTextBoxFlag xmlns="" xmlns:m="http://schemas.openxmlformats.org/officeDocument/2006/math" xmlns:a14="http://schemas.microsoft.com/office/drawing/2010/main" xmlns:ma14="http://schemas.microsoft.com/office/mac/drawingml/2011/main" val="1"/>
                     </a:ext>
                   </a:extLst>
                 </p:spPr>
@@ -33397,7 +33363,7 @@
                 </a:effectLst>
                 <a:extLst>
                   <a:ext uri="{C572A759-6A51-4108-AA02-DFA0A04FC94B}">
-                    <ma14:wrappingTextBoxFlag xmlns:ma14="http://schemas.microsoft.com/office/mac/drawingml/2011/main" xmlns:a14="http://schemas.microsoft.com/office/drawing/2010/main" xmlns:m="http://schemas.openxmlformats.org/officeDocument/2006/math" xmlns="" val="1"/>
+                    <ma14:wrappingTextBoxFlag xmlns="" xmlns:m="http://schemas.openxmlformats.org/officeDocument/2006/math" xmlns:a14="http://schemas.microsoft.com/office/drawing/2010/main" xmlns:ma14="http://schemas.microsoft.com/office/mac/drawingml/2011/main" val="1"/>
                   </a:ext>
                 </a:extLst>
               </p:spPr>
@@ -33575,7 +33541,7 @@
                   <a:effectLst/>
                   <a:extLst>
                     <a:ext uri="{C572A759-6A51-4108-AA02-DFA0A04FC94B}">
-                      <ma14:wrappingTextBoxFlag xmlns:ma14="http://schemas.microsoft.com/office/mac/drawingml/2011/main" xmlns:a14="http://schemas.microsoft.com/office/drawing/2010/main" xmlns:m="http://schemas.openxmlformats.org/officeDocument/2006/math" xmlns="" val="1"/>
+                      <ma14:wrappingTextBoxFlag xmlns="" xmlns:m="http://schemas.openxmlformats.org/officeDocument/2006/math" xmlns:a14="http://schemas.microsoft.com/office/drawing/2010/main" xmlns:ma14="http://schemas.microsoft.com/office/mac/drawingml/2011/main" val="1"/>
                     </a:ext>
                   </a:extLst>
                 </p:spPr>
@@ -33646,7 +33612,7 @@
             </a:effectLst>
             <a:extLst>
               <a:ext uri="{C572A759-6A51-4108-AA02-DFA0A04FC94B}">
-                <ma14:wrappingTextBoxFlag xmlns:ma14="http://schemas.microsoft.com/office/mac/drawingml/2011/main" xmlns:a14="http://schemas.microsoft.com/office/drawing/2010/main" xmlns:m="http://schemas.openxmlformats.org/officeDocument/2006/math" xmlns="" val="1"/>
+                <ma14:wrappingTextBoxFlag xmlns="" xmlns:m="http://schemas.openxmlformats.org/officeDocument/2006/math" xmlns:a14="http://schemas.microsoft.com/office/drawing/2010/main" xmlns:ma14="http://schemas.microsoft.com/office/mac/drawingml/2011/main" val="1"/>
               </a:ext>
             </a:extLst>
           </p:spPr>
@@ -33873,7 +33839,7 @@
           </a:prstGeom>
           <a:extLst>
             <a:ext uri="{C572A759-6A51-4108-AA02-DFA0A04FC94B}">
-              <ma14:wrappingTextBoxFlag xmlns:ma14="http://schemas.microsoft.com/office/mac/drawingml/2011/main" xmlns:a14="http://schemas.microsoft.com/office/drawing/2010/main" xmlns:m="http://schemas.openxmlformats.org/officeDocument/2006/math" xmlns="" val="1"/>
+              <ma14:wrappingTextBoxFlag xmlns="" xmlns:m="http://schemas.openxmlformats.org/officeDocument/2006/math" xmlns:a14="http://schemas.microsoft.com/office/drawing/2010/main" xmlns:ma14="http://schemas.microsoft.com/office/mac/drawingml/2011/main" val="1"/>
             </a:ext>
           </a:extLst>
         </p:spPr>
@@ -34811,7 +34777,7 @@
           </a:ln>
           <a:extLst>
             <a:ext uri="{C572A759-6A51-4108-AA02-DFA0A04FC94B}">
-              <ma14:wrappingTextBoxFlag xmlns="" xmlns:m="http://schemas.openxmlformats.org/officeDocument/2006/math" xmlns:a14="http://schemas.microsoft.com/office/drawing/2010/main" xmlns:ma14="http://schemas.microsoft.com/office/mac/drawingml/2011/main" val="1"/>
+              <ma14:wrappingTextBoxFlag xmlns:ma14="http://schemas.microsoft.com/office/mac/drawingml/2011/main" xmlns:a14="http://schemas.microsoft.com/office/drawing/2010/main" xmlns:m="http://schemas.openxmlformats.org/officeDocument/2006/math" xmlns="" val="1"/>
             </a:ext>
           </a:extLst>
         </p:spPr>
@@ -36872,7 +36838,7 @@
           </a:ln>
           <a:extLst>
             <a:ext uri="{C572A759-6A51-4108-AA02-DFA0A04FC94B}">
-              <ma14:wrappingTextBoxFlag xmlns:ma14="http://schemas.microsoft.com/office/mac/drawingml/2011/main" xmlns:a14="http://schemas.microsoft.com/office/drawing/2010/main" xmlns:m="http://schemas.openxmlformats.org/officeDocument/2006/math" xmlns="" val="1"/>
+              <ma14:wrappingTextBoxFlag xmlns="" xmlns:m="http://schemas.openxmlformats.org/officeDocument/2006/math" xmlns:a14="http://schemas.microsoft.com/office/drawing/2010/main" xmlns:ma14="http://schemas.microsoft.com/office/mac/drawingml/2011/main" val="1"/>
             </a:ext>
           </a:extLst>
         </p:spPr>
@@ -37654,7 +37620,7 @@
           </a:ln>
           <a:extLst>
             <a:ext uri="{C572A759-6A51-4108-AA02-DFA0A04FC94B}">
-              <ma14:wrappingTextBoxFlag xmlns:ma14="http://schemas.microsoft.com/office/mac/drawingml/2011/main" xmlns:a14="http://schemas.microsoft.com/office/drawing/2010/main" xmlns:m="http://schemas.openxmlformats.org/officeDocument/2006/math" xmlns="" val="1"/>
+              <ma14:wrappingTextBoxFlag xmlns="" xmlns:m="http://schemas.openxmlformats.org/officeDocument/2006/math" xmlns:a14="http://schemas.microsoft.com/office/drawing/2010/main" xmlns:ma14="http://schemas.microsoft.com/office/mac/drawingml/2011/main" val="1"/>
             </a:ext>
           </a:extLst>
         </p:spPr>

</xml_diff>